<commit_message>
Changed Bongo to scratchX setup
</commit_message>
<xml_diff>
--- a/scratch-leapmotion/instructions/nl/Scratch-opdracht_03_Bongo.pptx
+++ b/scratch-leapmotion/instructions/nl/Scratch-opdracht_03_Bongo.pptx
@@ -124,6 +124,22 @@
       </a:defRPr>
     </a:lvl9pPr>
   </p:defaultTextStyle>
+  <p:extLst>
+    <p:ext uri="{EFAFB233-063F-42B5-8137-9DF3F51BA10A}">
+      <p15:sldGuideLst xmlns:p15="http://schemas.microsoft.com/office/powerpoint/2012/main">
+        <p15:guide id="1" orient="horz" pos="2160">
+          <p15:clr>
+            <a:srgbClr val="A4A3A4"/>
+          </p15:clr>
+        </p15:guide>
+        <p15:guide id="2" pos="2880">
+          <p15:clr>
+            <a:srgbClr val="A4A3A4"/>
+          </p15:clr>
+        </p15:guide>
+      </p15:sldGuideLst>
+    </p:ext>
+  </p:extLst>
 </p:presentation>
 </file>
 
@@ -209,7 +225,7 @@
           <a:p>
             <a:fld id="{FD5240AD-D0E5-8743-BED0-4875EEDE37D1}" type="datetimeFigureOut">
               <a:rPr lang="en-US" smtClean="0"/>
-              <a:t>13/09/15</a:t>
+              <a:t>4/11/2018</a:t>
             </a:fld>
             <a:endParaRPr lang="en-US"/>
           </a:p>
@@ -275,7 +291,7 @@
           <a:p>
             <a:fld id="{279E9EA6-BBB3-1E40-BFD1-2E852B6140C4}" type="slidenum">
               <a:rPr lang="en-US" smtClean="0"/>
-              <a:t>‹#›</a:t>
+              <a:t>‹nr.›</a:t>
             </a:fld>
             <a:endParaRPr lang="en-US"/>
           </a:p>
@@ -375,7 +391,7 @@
           <a:p>
             <a:fld id="{59F1AF83-5EC3-2645-9357-E8053F4E6264}" type="datetimeFigureOut">
               <a:rPr lang="en-US" smtClean="0"/>
-              <a:t>13/09/15</a:t>
+              <a:t>4/11/2018</a:t>
             </a:fld>
             <a:endParaRPr lang="en-US"/>
           </a:p>
@@ -439,35 +455,35 @@
           <a:p>
             <a:pPr lvl="0"/>
             <a:r>
-              <a:rPr lang="nl-BE" smtClean="0"/>
+              <a:rPr lang="nl-BE"/>
               <a:t>Click to edit Master text styles</a:t>
             </a:r>
           </a:p>
           <a:p>
             <a:pPr lvl="1"/>
             <a:r>
-              <a:rPr lang="nl-BE" smtClean="0"/>
+              <a:rPr lang="nl-BE"/>
               <a:t>Second level</a:t>
             </a:r>
           </a:p>
           <a:p>
             <a:pPr lvl="2"/>
             <a:r>
-              <a:rPr lang="nl-BE" smtClean="0"/>
+              <a:rPr lang="nl-BE"/>
               <a:t>Third level</a:t>
             </a:r>
           </a:p>
           <a:p>
             <a:pPr lvl="3"/>
             <a:r>
-              <a:rPr lang="nl-BE" smtClean="0"/>
+              <a:rPr lang="nl-BE"/>
               <a:t>Fourth level</a:t>
             </a:r>
           </a:p>
           <a:p>
             <a:pPr lvl="4"/>
             <a:r>
-              <a:rPr lang="nl-BE" smtClean="0"/>
+              <a:rPr lang="nl-BE"/>
               <a:t>Fifth level</a:t>
             </a:r>
             <a:endParaRPr lang="en-US"/>
@@ -534,7 +550,7 @@
           <a:p>
             <a:fld id="{019186DE-8459-354D-92FA-6DAD5BD2E459}" type="slidenum">
               <a:rPr lang="en-US" smtClean="0"/>
-              <a:t>‹#›</a:t>
+              <a:t>‹nr.›</a:t>
             </a:fld>
             <a:endParaRPr lang="en-US"/>
           </a:p>
@@ -685,7 +701,7 @@
           <a:lstStyle/>
           <a:p>
             <a:r>
-              <a:rPr lang="nl-BE" smtClean="0"/>
+              <a:rPr lang="nl-BE"/>
               <a:t>Click to edit Master title style</a:t>
             </a:r>
             <a:endParaRPr lang="en-US"/>
@@ -807,7 +823,7 @@
           </a:lstStyle>
           <a:p>
             <a:r>
-              <a:rPr lang="nl-BE" smtClean="0"/>
+              <a:rPr lang="nl-BE"/>
               <a:t>Click to edit Master subtitle style</a:t>
             </a:r>
             <a:endParaRPr lang="en-US"/>
@@ -995,7 +1011,7 @@
           </a:lstStyle>
           <a:p>
             <a:r>
-              <a:rPr lang="nl-BE" sz="1800" dirty="0" smtClean="0">
+              <a:rPr lang="nl-BE" sz="1800" dirty="0">
                 <a:latin typeface="+mn-lt"/>
               </a:rPr>
               <a:t>www.devoxx4kids.com</a:t>
@@ -1061,35 +1077,35 @@
           <a:p>
             <a:pPr lvl="0"/>
             <a:r>
-              <a:rPr lang="nl-BE" dirty="0" smtClean="0"/>
+              <a:rPr lang="nl-BE" dirty="0"/>
               <a:t>Click to edit Master text styles</a:t>
             </a:r>
           </a:p>
           <a:p>
             <a:pPr lvl="1"/>
             <a:r>
-              <a:rPr lang="nl-BE" dirty="0" smtClean="0"/>
+              <a:rPr lang="nl-BE" dirty="0"/>
               <a:t>Second level</a:t>
             </a:r>
           </a:p>
           <a:p>
             <a:pPr lvl="2"/>
             <a:r>
-              <a:rPr lang="nl-BE" dirty="0" smtClean="0"/>
+              <a:rPr lang="nl-BE" dirty="0"/>
               <a:t>Third level</a:t>
             </a:r>
           </a:p>
           <a:p>
             <a:pPr lvl="3"/>
             <a:r>
-              <a:rPr lang="nl-BE" dirty="0" smtClean="0"/>
+              <a:rPr lang="nl-BE" dirty="0"/>
               <a:t>Fourth level</a:t>
             </a:r>
           </a:p>
           <a:p>
             <a:pPr lvl="4"/>
             <a:r>
-              <a:rPr lang="nl-BE" dirty="0" smtClean="0"/>
+              <a:rPr lang="nl-BE" dirty="0"/>
               <a:t>Fifth level</a:t>
             </a:r>
             <a:endParaRPr lang="en-US" dirty="0"/>
@@ -1123,7 +1139,7 @@
             <a:fld id="{6C0001A9-357E-7541-840E-1F18FD9D64CA}" type="slidenum">
               <a:rPr lang="en-US" smtClean="0"/>
               <a:pPr algn="r"/>
-              <a:t>‹#›</a:t>
+              <a:t>‹nr.›</a:t>
             </a:fld>
             <a:endParaRPr lang="en-US" dirty="0"/>
           </a:p>
@@ -1181,7 +1197,7 @@
           <a:lstStyle/>
           <a:p>
             <a:r>
-              <a:rPr lang="nl-BE" dirty="0" smtClean="0"/>
+              <a:rPr lang="nl-BE" dirty="0"/>
               <a:t>Click to edit Master title style</a:t>
             </a:r>
             <a:endParaRPr lang="en-US" dirty="0"/>
@@ -1249,7 +1265,7 @@
           </a:lstStyle>
           <a:p>
             <a:r>
-              <a:rPr lang="nl-BE" sz="1800" dirty="0" smtClean="0">
+              <a:rPr lang="nl-BE" sz="1800" dirty="0">
                 <a:latin typeface="+mn-lt"/>
               </a:rPr>
               <a:t>www.devoxx4kids.com</a:t>
@@ -1314,7 +1330,7 @@
           <a:lstStyle/>
           <a:p>
             <a:r>
-              <a:rPr lang="nl-BE" dirty="0" smtClean="0"/>
+              <a:rPr lang="nl-BE" dirty="0"/>
               <a:t>Click to edit Master title style</a:t>
             </a:r>
             <a:endParaRPr lang="en-US" dirty="0"/>
@@ -1346,35 +1362,35 @@
           <a:p>
             <a:pPr lvl="0"/>
             <a:r>
-              <a:rPr lang="nl-BE" dirty="0" smtClean="0"/>
+              <a:rPr lang="nl-BE" dirty="0"/>
               <a:t>Click to edit Master text styles</a:t>
             </a:r>
           </a:p>
           <a:p>
             <a:pPr lvl="1"/>
             <a:r>
-              <a:rPr lang="nl-BE" dirty="0" smtClean="0"/>
+              <a:rPr lang="nl-BE" dirty="0"/>
               <a:t>Second level</a:t>
             </a:r>
           </a:p>
           <a:p>
             <a:pPr lvl="2"/>
             <a:r>
-              <a:rPr lang="nl-BE" dirty="0" smtClean="0"/>
+              <a:rPr lang="nl-BE" dirty="0"/>
               <a:t>Third level</a:t>
             </a:r>
           </a:p>
           <a:p>
             <a:pPr lvl="3"/>
             <a:r>
-              <a:rPr lang="nl-BE" dirty="0" smtClean="0"/>
+              <a:rPr lang="nl-BE" dirty="0"/>
               <a:t>Fourth level</a:t>
             </a:r>
           </a:p>
           <a:p>
             <a:pPr lvl="4"/>
             <a:r>
-              <a:rPr lang="nl-BE" dirty="0" smtClean="0"/>
+              <a:rPr lang="nl-BE" dirty="0"/>
               <a:t>Fifth level</a:t>
             </a:r>
             <a:endParaRPr lang="en-US" dirty="0"/>
@@ -1408,7 +1424,7 @@
             <a:fld id="{6C0001A9-357E-7541-840E-1F18FD9D64CA}" type="slidenum">
               <a:rPr lang="en-US" smtClean="0"/>
               <a:pPr algn="r"/>
-              <a:t>‹#›</a:t>
+              <a:t>‹nr.›</a:t>
             </a:fld>
             <a:endParaRPr lang="en-US" dirty="0"/>
           </a:p>
@@ -1475,7 +1491,7 @@
           </a:lstStyle>
           <a:p>
             <a:r>
-              <a:rPr lang="nl-BE" sz="1800" dirty="0" smtClean="0">
+              <a:rPr lang="nl-BE" sz="1800" dirty="0">
                 <a:latin typeface="+mn-lt"/>
               </a:rPr>
               <a:t>www.devoxx4kids.com</a:t>
@@ -1572,7 +1588,7 @@
           </a:lstStyle>
           <a:p>
             <a:r>
-              <a:rPr lang="nl-BE" smtClean="0"/>
+              <a:rPr lang="nl-BE"/>
               <a:t>Click to edit Master title style</a:t>
             </a:r>
             <a:endParaRPr lang="en-US"/>
@@ -1695,7 +1711,7 @@
           <a:p>
             <a:pPr lvl="0"/>
             <a:r>
-              <a:rPr lang="nl-BE" smtClean="0"/>
+              <a:rPr lang="nl-BE"/>
               <a:t>Click to edit Master text styles</a:t>
             </a:r>
           </a:p>
@@ -1731,7 +1747,7 @@
             <a:fld id="{6C0001A9-357E-7541-840E-1F18FD9D64CA}" type="slidenum">
               <a:rPr lang="en-US" smtClean="0"/>
               <a:pPr/>
-              <a:t>‹#›</a:t>
+              <a:t>‹nr.›</a:t>
             </a:fld>
             <a:endParaRPr lang="en-US" dirty="0"/>
           </a:p>
@@ -1826,7 +1842,7 @@
           </a:lstStyle>
           <a:p>
             <a:r>
-              <a:rPr lang="nl-BE" sz="1800" dirty="0" smtClean="0">
+              <a:rPr lang="nl-BE" sz="1800" dirty="0">
                 <a:latin typeface="+mn-lt"/>
               </a:rPr>
               <a:t>www.devoxx4kids.com</a:t>
@@ -1920,35 +1936,35 @@
           <a:p>
             <a:pPr lvl="0"/>
             <a:r>
-              <a:rPr lang="nl-BE" smtClean="0"/>
+              <a:rPr lang="nl-BE"/>
               <a:t>Click to edit Master text styles</a:t>
             </a:r>
           </a:p>
           <a:p>
             <a:pPr lvl="1"/>
             <a:r>
-              <a:rPr lang="nl-BE" smtClean="0"/>
+              <a:rPr lang="nl-BE"/>
               <a:t>Second level</a:t>
             </a:r>
           </a:p>
           <a:p>
             <a:pPr lvl="2"/>
             <a:r>
-              <a:rPr lang="nl-BE" smtClean="0"/>
+              <a:rPr lang="nl-BE"/>
               <a:t>Third level</a:t>
             </a:r>
           </a:p>
           <a:p>
             <a:pPr lvl="3"/>
             <a:r>
-              <a:rPr lang="nl-BE" smtClean="0"/>
+              <a:rPr lang="nl-BE"/>
               <a:t>Fourth level</a:t>
             </a:r>
           </a:p>
           <a:p>
             <a:pPr lvl="4"/>
             <a:r>
-              <a:rPr lang="nl-BE" smtClean="0"/>
+              <a:rPr lang="nl-BE"/>
               <a:t>Fifth level</a:t>
             </a:r>
             <a:endParaRPr lang="en-US"/>
@@ -2008,35 +2024,35 @@
           <a:p>
             <a:pPr lvl="0"/>
             <a:r>
-              <a:rPr lang="nl-BE" smtClean="0"/>
+              <a:rPr lang="nl-BE"/>
               <a:t>Click to edit Master text styles</a:t>
             </a:r>
           </a:p>
           <a:p>
             <a:pPr lvl="1"/>
             <a:r>
-              <a:rPr lang="nl-BE" smtClean="0"/>
+              <a:rPr lang="nl-BE"/>
               <a:t>Second level</a:t>
             </a:r>
           </a:p>
           <a:p>
             <a:pPr lvl="2"/>
             <a:r>
-              <a:rPr lang="nl-BE" smtClean="0"/>
+              <a:rPr lang="nl-BE"/>
               <a:t>Third level</a:t>
             </a:r>
           </a:p>
           <a:p>
             <a:pPr lvl="3"/>
             <a:r>
-              <a:rPr lang="nl-BE" smtClean="0"/>
+              <a:rPr lang="nl-BE"/>
               <a:t>Fourth level</a:t>
             </a:r>
           </a:p>
           <a:p>
             <a:pPr lvl="4"/>
             <a:r>
-              <a:rPr lang="nl-BE" smtClean="0"/>
+              <a:rPr lang="nl-BE"/>
               <a:t>Fifth level</a:t>
             </a:r>
             <a:endParaRPr lang="en-US"/>
@@ -2070,7 +2086,7 @@
             <a:fld id="{6C0001A9-357E-7541-840E-1F18FD9D64CA}" type="slidenum">
               <a:rPr lang="en-US" smtClean="0"/>
               <a:pPr algn="r"/>
-              <a:t>‹#›</a:t>
+              <a:t>‹nr.›</a:t>
             </a:fld>
             <a:endParaRPr lang="en-US" dirty="0"/>
           </a:p>
@@ -2128,7 +2144,7 @@
           <a:lstStyle/>
           <a:p>
             <a:r>
-              <a:rPr lang="nl-BE" dirty="0" smtClean="0"/>
+              <a:rPr lang="nl-BE" dirty="0"/>
               <a:t>Click to edit Master title style</a:t>
             </a:r>
             <a:endParaRPr lang="en-US" dirty="0"/>
@@ -2196,7 +2212,7 @@
           </a:lstStyle>
           <a:p>
             <a:r>
-              <a:rPr lang="nl-BE" sz="1800" dirty="0" smtClean="0">
+              <a:rPr lang="nl-BE" sz="1800" dirty="0">
                 <a:latin typeface="+mn-lt"/>
               </a:rPr>
               <a:t>www.devoxx4kids.com</a:t>
@@ -2299,7 +2315,7 @@
           <a:p>
             <a:pPr lvl="0"/>
             <a:r>
-              <a:rPr lang="nl-BE" smtClean="0"/>
+              <a:rPr lang="nl-BE"/>
               <a:t>Click to edit Master text styles</a:t>
             </a:r>
           </a:p>
@@ -2358,35 +2374,35 @@
           <a:p>
             <a:pPr lvl="0"/>
             <a:r>
-              <a:rPr lang="nl-BE" smtClean="0"/>
+              <a:rPr lang="nl-BE"/>
               <a:t>Click to edit Master text styles</a:t>
             </a:r>
           </a:p>
           <a:p>
             <a:pPr lvl="1"/>
             <a:r>
-              <a:rPr lang="nl-BE" smtClean="0"/>
+              <a:rPr lang="nl-BE"/>
               <a:t>Second level</a:t>
             </a:r>
           </a:p>
           <a:p>
             <a:pPr lvl="2"/>
             <a:r>
-              <a:rPr lang="nl-BE" smtClean="0"/>
+              <a:rPr lang="nl-BE"/>
               <a:t>Third level</a:t>
             </a:r>
           </a:p>
           <a:p>
             <a:pPr lvl="3"/>
             <a:r>
-              <a:rPr lang="nl-BE" smtClean="0"/>
+              <a:rPr lang="nl-BE"/>
               <a:t>Fourth level</a:t>
             </a:r>
           </a:p>
           <a:p>
             <a:pPr lvl="4"/>
             <a:r>
-              <a:rPr lang="nl-BE" smtClean="0"/>
+              <a:rPr lang="nl-BE"/>
               <a:t>Fifth level</a:t>
             </a:r>
             <a:endParaRPr lang="en-US"/>
@@ -2455,7 +2471,7 @@
           <a:p>
             <a:pPr lvl="0"/>
             <a:r>
-              <a:rPr lang="nl-BE" smtClean="0"/>
+              <a:rPr lang="nl-BE"/>
               <a:t>Click to edit Master text styles</a:t>
             </a:r>
           </a:p>
@@ -2514,35 +2530,35 @@
           <a:p>
             <a:pPr lvl="0"/>
             <a:r>
-              <a:rPr lang="nl-BE" smtClean="0"/>
+              <a:rPr lang="nl-BE"/>
               <a:t>Click to edit Master text styles</a:t>
             </a:r>
           </a:p>
           <a:p>
             <a:pPr lvl="1"/>
             <a:r>
-              <a:rPr lang="nl-BE" smtClean="0"/>
+              <a:rPr lang="nl-BE"/>
               <a:t>Second level</a:t>
             </a:r>
           </a:p>
           <a:p>
             <a:pPr lvl="2"/>
             <a:r>
-              <a:rPr lang="nl-BE" smtClean="0"/>
+              <a:rPr lang="nl-BE"/>
               <a:t>Third level</a:t>
             </a:r>
           </a:p>
           <a:p>
             <a:pPr lvl="3"/>
             <a:r>
-              <a:rPr lang="nl-BE" smtClean="0"/>
+              <a:rPr lang="nl-BE"/>
               <a:t>Fourth level</a:t>
             </a:r>
           </a:p>
           <a:p>
             <a:pPr lvl="4"/>
             <a:r>
-              <a:rPr lang="nl-BE" smtClean="0"/>
+              <a:rPr lang="nl-BE"/>
               <a:t>Fifth level</a:t>
             </a:r>
             <a:endParaRPr lang="en-US"/>
@@ -2576,7 +2592,7 @@
             <a:fld id="{6C0001A9-357E-7541-840E-1F18FD9D64CA}" type="slidenum">
               <a:rPr lang="en-US" smtClean="0"/>
               <a:pPr algn="r"/>
-              <a:t>‹#›</a:t>
+              <a:t>‹nr.›</a:t>
             </a:fld>
             <a:endParaRPr lang="en-US" dirty="0"/>
           </a:p>
@@ -2634,7 +2650,7 @@
           <a:lstStyle/>
           <a:p>
             <a:r>
-              <a:rPr lang="nl-BE" dirty="0" smtClean="0"/>
+              <a:rPr lang="nl-BE" dirty="0"/>
               <a:t>Click to edit Master title style</a:t>
             </a:r>
             <a:endParaRPr lang="en-US" dirty="0"/>
@@ -2702,7 +2718,7 @@
           </a:lstStyle>
           <a:p>
             <a:r>
-              <a:rPr lang="nl-BE" sz="1800" dirty="0" smtClean="0">
+              <a:rPr lang="nl-BE" sz="1800" dirty="0">
                 <a:latin typeface="+mn-lt"/>
               </a:rPr>
               <a:t>www.devoxx4kids.com</a:t>
@@ -2770,7 +2786,7 @@
             <a:fld id="{6C0001A9-357E-7541-840E-1F18FD9D64CA}" type="slidenum">
               <a:rPr lang="en-US" smtClean="0"/>
               <a:pPr algn="r"/>
-              <a:t>‹#›</a:t>
+              <a:t>‹nr.›</a:t>
             </a:fld>
             <a:endParaRPr lang="en-US" dirty="0"/>
           </a:p>
@@ -2828,7 +2844,7 @@
           <a:lstStyle/>
           <a:p>
             <a:r>
-              <a:rPr lang="nl-BE" dirty="0" smtClean="0"/>
+              <a:rPr lang="nl-BE" dirty="0"/>
               <a:t>Click to edit Master title style</a:t>
             </a:r>
             <a:endParaRPr lang="en-US" dirty="0"/>
@@ -2896,7 +2912,7 @@
           </a:lstStyle>
           <a:p>
             <a:r>
-              <a:rPr lang="nl-BE" sz="1800" dirty="0" smtClean="0">
+              <a:rPr lang="nl-BE" sz="1800" dirty="0">
                 <a:latin typeface="+mn-lt"/>
               </a:rPr>
               <a:t>www.devoxx4kids.com</a:t>
@@ -2964,7 +2980,7 @@
             <a:fld id="{6C0001A9-357E-7541-840E-1F18FD9D64CA}" type="slidenum">
               <a:rPr lang="en-US" smtClean="0"/>
               <a:pPr algn="r"/>
-              <a:t>‹#›</a:t>
+              <a:t>‹nr.›</a:t>
             </a:fld>
             <a:endParaRPr lang="en-US" dirty="0"/>
           </a:p>
@@ -3059,7 +3075,7 @@
           </a:lstStyle>
           <a:p>
             <a:r>
-              <a:rPr lang="nl-BE" sz="1800" dirty="0" smtClean="0">
+              <a:rPr lang="nl-BE" sz="1800" dirty="0">
                 <a:latin typeface="+mn-lt"/>
               </a:rPr>
               <a:t>www.devoxx4kids.com</a:t>
@@ -3128,7 +3144,7 @@
           </a:lstStyle>
           <a:p>
             <a:r>
-              <a:rPr lang="nl-BE" dirty="0" smtClean="0"/>
+              <a:rPr lang="nl-BE" dirty="0"/>
               <a:t>Click to edit Master title style</a:t>
             </a:r>
             <a:endParaRPr lang="en-US" dirty="0"/>
@@ -3188,35 +3204,35 @@
           <a:p>
             <a:pPr lvl="0"/>
             <a:r>
-              <a:rPr lang="nl-BE" smtClean="0"/>
+              <a:rPr lang="nl-BE"/>
               <a:t>Click to edit Master text styles</a:t>
             </a:r>
           </a:p>
           <a:p>
             <a:pPr lvl="1"/>
             <a:r>
-              <a:rPr lang="nl-BE" smtClean="0"/>
+              <a:rPr lang="nl-BE"/>
               <a:t>Second level</a:t>
             </a:r>
           </a:p>
           <a:p>
             <a:pPr lvl="2"/>
             <a:r>
-              <a:rPr lang="nl-BE" smtClean="0"/>
+              <a:rPr lang="nl-BE"/>
               <a:t>Third level</a:t>
             </a:r>
           </a:p>
           <a:p>
             <a:pPr lvl="3"/>
             <a:r>
-              <a:rPr lang="nl-BE" smtClean="0"/>
+              <a:rPr lang="nl-BE"/>
               <a:t>Fourth level</a:t>
             </a:r>
           </a:p>
           <a:p>
             <a:pPr lvl="4"/>
             <a:r>
-              <a:rPr lang="nl-BE" smtClean="0"/>
+              <a:rPr lang="nl-BE"/>
               <a:t>Fifth level</a:t>
             </a:r>
             <a:endParaRPr lang="en-US"/>
@@ -3285,7 +3301,7 @@
           <a:p>
             <a:pPr lvl="0"/>
             <a:r>
-              <a:rPr lang="nl-BE" dirty="0" smtClean="0"/>
+              <a:rPr lang="nl-BE" dirty="0"/>
               <a:t>Click to edit Master text styles</a:t>
             </a:r>
           </a:p>
@@ -3346,7 +3362,7 @@
             <a:fld id="{6C0001A9-357E-7541-840E-1F18FD9D64CA}" type="slidenum">
               <a:rPr lang="en-US" smtClean="0"/>
               <a:pPr algn="r"/>
-              <a:t>‹#›</a:t>
+              <a:t>‹nr.›</a:t>
             </a:fld>
             <a:endParaRPr lang="en-US" dirty="0"/>
           </a:p>
@@ -3413,7 +3429,7 @@
           </a:lstStyle>
           <a:p>
             <a:r>
-              <a:rPr lang="nl-BE" sz="1800" dirty="0" smtClean="0">
+              <a:rPr lang="nl-BE" sz="1800" dirty="0">
                 <a:latin typeface="+mn-lt"/>
               </a:rPr>
               <a:t>www.devoxx4kids.com</a:t>
@@ -3482,7 +3498,7 @@
           </a:lstStyle>
           <a:p>
             <a:r>
-              <a:rPr lang="nl-BE" dirty="0" smtClean="0"/>
+              <a:rPr lang="nl-BE" dirty="0"/>
               <a:t>Click to edit Master title style</a:t>
             </a:r>
             <a:endParaRPr lang="en-US" dirty="0"/>
@@ -3615,7 +3631,7 @@
           <a:p>
             <a:pPr lvl="0"/>
             <a:r>
-              <a:rPr lang="nl-BE" smtClean="0"/>
+              <a:rPr lang="nl-BE"/>
               <a:t>Click to edit Master text styles</a:t>
             </a:r>
           </a:p>
@@ -3648,7 +3664,7 @@
             <a:fld id="{6C0001A9-357E-7541-840E-1F18FD9D64CA}" type="slidenum">
               <a:rPr lang="en-US" smtClean="0"/>
               <a:pPr algn="r"/>
-              <a:t>‹#›</a:t>
+              <a:t>‹nr.›</a:t>
             </a:fld>
             <a:endParaRPr lang="en-US" dirty="0"/>
           </a:p>
@@ -3743,7 +3759,7 @@
           </a:lstStyle>
           <a:p>
             <a:r>
-              <a:rPr lang="nl-BE" sz="1800" dirty="0" smtClean="0">
+              <a:rPr lang="nl-BE" sz="1800" dirty="0">
                 <a:latin typeface="+mn-lt"/>
               </a:rPr>
               <a:t>www.devoxx4kids.com</a:t>
@@ -4112,7 +4128,7 @@
           <a:noFill/>
           <a:extLst>
             <a:ext uri="{909E8E84-426E-40dd-AFC4-6F175D3DCCD1}">
-              <a14:hiddenFill xmlns:a14="http://schemas.microsoft.com/office/drawing/2010/main">
+              <a14:hiddenFill xmlns:a14="http://schemas.microsoft.com/office/drawing/2010/main" xmlns="">
                 <a:solidFill>
                   <a:srgbClr val="FFFFFF"/>
                 </a:solidFill>
@@ -4153,7 +4169,7 @@
           <a:noFill/>
           <a:extLst>
             <a:ext uri="{909E8E84-426E-40dd-AFC4-6F175D3DCCD1}">
-              <a14:hiddenFill xmlns:a14="http://schemas.microsoft.com/office/drawing/2010/main">
+              <a14:hiddenFill xmlns:a14="http://schemas.microsoft.com/office/drawing/2010/main" xmlns="">
                 <a:solidFill>
                   <a:srgbClr val="FFFFFF"/>
                 </a:solidFill>
@@ -4178,17 +4194,16 @@
           <a:lstStyle/>
           <a:p>
             <a:r>
-              <a:rPr lang="nl-NL" dirty="0" smtClean="0"/>
+              <a:rPr lang="nl-NL" dirty="0"/>
               <a:t>Programmeren</a:t>
             </a:r>
             <a:br>
-              <a:rPr lang="nl-NL" dirty="0" smtClean="0"/>
+              <a:rPr lang="nl-NL" dirty="0"/>
             </a:br>
             <a:r>
-              <a:rPr lang="nl-NL" dirty="0" smtClean="0"/>
+              <a:rPr lang="nl-NL" dirty="0"/>
               <a:t>Bongo</a:t>
             </a:r>
-            <a:endParaRPr lang="nl-NL" dirty="0"/>
           </a:p>
         </p:txBody>
       </p:sp>
@@ -4202,13 +4217,6 @@
   <p:clrMapOvr>
     <a:masterClrMapping/>
   </p:clrMapOvr>
-  <p:timing>
-    <p:tnLst>
-      <p:par>
-        <p:cTn xmlns:p14="http://schemas.microsoft.com/office/powerpoint/2010/main" id="1" dur="indefinite" restart="never" nodeType="tmRoot"/>
-      </p:par>
-    </p:tnLst>
-  </p:timing>
 </p:sld>
 </file>
 
@@ -4251,16 +4259,12 @@
           <a:p>
             <a:pPr algn="l"/>
             <a:r>
-              <a:rPr lang="en-US" dirty="0" smtClean="0">
+              <a:rPr lang="en-US" dirty="0">
                 <a:latin typeface="Comic Sans MS"/>
                 <a:cs typeface="Comic Sans MS"/>
               </a:rPr>
               <a:t>Bongo</a:t>
             </a:r>
-            <a:endParaRPr lang="en-US" dirty="0">
-              <a:latin typeface="Comic Sans MS"/>
-              <a:cs typeface="Comic Sans MS"/>
-            </a:endParaRPr>
           </a:p>
         </p:txBody>
       </p:sp>
@@ -4332,28 +4336,14 @@
           <a:lstStyle/>
           <a:p>
             <a:r>
-              <a:rPr lang="nl-NL" dirty="0" smtClean="0">
-                <a:latin typeface="Comic Sans MS"/>
-                <a:cs typeface="Comic Sans MS"/>
-              </a:rPr>
-              <a:t>Klik </a:t>
-            </a:r>
-            <a:r>
-              <a:rPr lang="nl-NL" dirty="0">
-                <a:latin typeface="Comic Sans MS"/>
-                <a:cs typeface="Comic Sans MS"/>
-              </a:rPr>
-              <a:t>op </a:t>
-            </a:r>
-            <a:r>
-              <a:rPr lang="nl-NL" dirty="0" smtClean="0">
-                <a:latin typeface="Comic Sans MS"/>
-                <a:cs typeface="Comic Sans MS"/>
-              </a:rPr>
-              <a:t>‘</a:t>
-            </a:r>
-            <a:r>
-              <a:rPr lang="nl-NL" dirty="0" smtClean="0">
+              <a:rPr lang="nl-NL" dirty="0">
+                <a:latin typeface="Comic Sans MS"/>
+                <a:cs typeface="Comic Sans MS"/>
+              </a:rPr>
+              <a:t>Klik op ‘</a:t>
+            </a:r>
+            <a:r>
+              <a:rPr lang="nl-NL" dirty="0">
                 <a:solidFill>
                   <a:srgbClr val="4BAF00"/>
                 </a:solidFill>
@@ -4363,44 +4353,23 @@
               <a:t>Functies</a:t>
             </a:r>
             <a:r>
-              <a:rPr lang="nl-NL" dirty="0" smtClean="0">
-                <a:latin typeface="Comic Sans MS"/>
-                <a:cs typeface="Comic Sans MS"/>
-              </a:rPr>
-              <a:t>’ </a:t>
-            </a:r>
-            <a:r>
-              <a:rPr lang="nl-NL" dirty="0">
-                <a:latin typeface="Comic Sans MS"/>
-                <a:cs typeface="Comic Sans MS"/>
-              </a:rPr>
-              <a:t>bouwstenen.</a:t>
-            </a:r>
-          </a:p>
-          <a:p>
-            <a:r>
-              <a:rPr lang="nl-NL" dirty="0" smtClean="0">
-                <a:latin typeface="Comic Sans MS"/>
-                <a:cs typeface="Comic Sans MS"/>
-              </a:rPr>
-              <a:t>Sleep </a:t>
-            </a:r>
-            <a:r>
-              <a:rPr lang="nl-NL" dirty="0">
-                <a:latin typeface="Comic Sans MS"/>
-                <a:cs typeface="Comic Sans MS"/>
-              </a:rPr>
-              <a:t>dan de bouwsteen </a:t>
-            </a:r>
-            <a:r>
-              <a:rPr lang="nl-NL" dirty="0" smtClean="0">
-                <a:latin typeface="Comic Sans MS"/>
-                <a:cs typeface="Comic Sans MS"/>
-              </a:rPr>
-              <a:t>‘</a:t>
-            </a:r>
-            <a:r>
-              <a:rPr lang="nl-NL" dirty="0" smtClean="0">
+              <a:rPr lang="nl-NL" dirty="0">
+                <a:latin typeface="Comic Sans MS"/>
+                <a:cs typeface="Comic Sans MS"/>
+              </a:rPr>
+              <a:t>’ bouwstenen.</a:t>
+            </a:r>
+          </a:p>
+          <a:p>
+            <a:r>
+              <a:rPr lang="nl-NL" dirty="0">
+                <a:latin typeface="Comic Sans MS"/>
+                <a:cs typeface="Comic Sans MS"/>
+              </a:rPr>
+              <a:t>Sleep dan de bouwsteen ‘</a:t>
+            </a:r>
+            <a:r>
+              <a:rPr lang="nl-NL" dirty="0">
                 <a:solidFill>
                   <a:srgbClr val="4BAF00"/>
                 </a:solidFill>
@@ -4410,26 +4379,40 @@
               <a:t>niet</a:t>
             </a:r>
             <a:r>
-              <a:rPr lang="nl-NL" dirty="0" smtClean="0">
-                <a:latin typeface="Comic Sans MS"/>
-                <a:cs typeface="Comic Sans MS"/>
-              </a:rPr>
-              <a:t>’ </a:t>
-            </a:r>
-            <a:r>
-              <a:rPr lang="nl-NL" dirty="0">
-                <a:latin typeface="Comic Sans MS"/>
-                <a:cs typeface="Comic Sans MS"/>
-              </a:rPr>
-              <a:t>naar het programma veld en plaats hem </a:t>
-            </a:r>
-            <a:r>
-              <a:rPr lang="nl-NL" dirty="0" smtClean="0">
-                <a:latin typeface="Comic Sans MS"/>
-                <a:cs typeface="Comic Sans MS"/>
-              </a:rPr>
-              <a:t>in het veld van de wacht tot steen.</a:t>
-            </a:r>
+              <a:rPr lang="nl-NL" dirty="0">
+                <a:latin typeface="Comic Sans MS"/>
+                <a:cs typeface="Comic Sans MS"/>
+              </a:rPr>
+              <a:t>’ naar het programma veld en plaats hem in het veld van de wacht tot steen.</a:t>
+            </a:r>
+          </a:p>
+          <a:p>
+            <a:r>
+              <a:rPr lang="nl-NL" dirty="0">
+                <a:latin typeface="Comic Sans MS"/>
+                <a:cs typeface="Comic Sans MS"/>
+              </a:rPr>
+              <a:t>Sleep dan de bouwsteen ‘</a:t>
+            </a:r>
+            <a:r>
+              <a:rPr lang="nl-NL" dirty="0">
+                <a:solidFill>
+                  <a:srgbClr val="4BAF00"/>
+                </a:solidFill>
+                <a:latin typeface="Comic Sans MS"/>
+                <a:cs typeface="Comic Sans MS"/>
+              </a:rPr>
+              <a:t>of</a:t>
+            </a:r>
+            <a:r>
+              <a:rPr lang="nl-NL" dirty="0">
+                <a:latin typeface="Comic Sans MS"/>
+                <a:cs typeface="Comic Sans MS"/>
+              </a:rPr>
+              <a:t>’ naar het programma veld en plaats hem in het veld van de niet-steen.</a:t>
+            </a:r>
+          </a:p>
+          <a:p>
             <a:endParaRPr lang="nl-NL" dirty="0">
               <a:latin typeface="Comic Sans MS"/>
               <a:cs typeface="Comic Sans MS"/>
@@ -4441,194 +4424,95 @@
                 <a:latin typeface="Comic Sans MS"/>
                 <a:cs typeface="Comic Sans MS"/>
               </a:rPr>
-              <a:t>Sleep dan de bouwsteen ‘</a:t>
+              <a:t>Klik op ‘</a:t>
             </a:r>
             <a:r>
               <a:rPr lang="nl-NL" dirty="0">
                 <a:solidFill>
-                  <a:srgbClr val="4BAF00"/>
+                  <a:srgbClr val="1F90DB"/>
                 </a:solidFill>
                 <a:latin typeface="Comic Sans MS"/>
                 <a:cs typeface="Comic Sans MS"/>
               </a:rPr>
-              <a:t>of</a:t>
-            </a:r>
-            <a:r>
-              <a:rPr lang="nl-NL" dirty="0">
-                <a:latin typeface="Comic Sans MS"/>
-                <a:cs typeface="Comic Sans MS"/>
-              </a:rPr>
-              <a:t>’ naar het programma veld en plaats hem in het veld </a:t>
-            </a:r>
-            <a:r>
-              <a:rPr lang="nl-NL" dirty="0" smtClean="0">
-                <a:latin typeface="Comic Sans MS"/>
-                <a:cs typeface="Comic Sans MS"/>
-              </a:rPr>
-              <a:t>van de niet-steen.</a:t>
-            </a:r>
+              <a:t>Waarnemen</a:t>
+            </a:r>
+            <a:r>
+              <a:rPr lang="nl-NL" dirty="0">
+                <a:latin typeface="Comic Sans MS"/>
+                <a:cs typeface="Comic Sans MS"/>
+              </a:rPr>
+              <a:t>’ bouwstenen.</a:t>
+            </a:r>
+          </a:p>
+          <a:p>
+            <a:r>
+              <a:rPr lang="nl-NL" dirty="0">
+                <a:latin typeface="Comic Sans MS"/>
+                <a:cs typeface="Comic Sans MS"/>
+              </a:rPr>
+              <a:t>Sleep twee keer de bouwsteen ‘</a:t>
+            </a:r>
+            <a:r>
+              <a:rPr lang="nl-NL" dirty="0">
+                <a:solidFill>
+                  <a:srgbClr val="1F90DB"/>
+                </a:solidFill>
+                <a:latin typeface="Comic Sans MS"/>
+                <a:cs typeface="Comic Sans MS"/>
+              </a:rPr>
+              <a:t>raak ik ?</a:t>
+            </a:r>
+            <a:r>
+              <a:rPr lang="nl-NL" dirty="0">
+                <a:latin typeface="Comic Sans MS"/>
+                <a:cs typeface="Comic Sans MS"/>
+              </a:rPr>
+              <a:t>’ naar het programma veld en plaats ze in de velden links en rechts van de of. Klik op het pijltje en kies in het eerste blok ‘</a:t>
+            </a:r>
+            <a:r>
+              <a:rPr lang="nl-NL" dirty="0">
+                <a:solidFill>
+                  <a:srgbClr val="1F90DB"/>
+                </a:solidFill>
+                <a:latin typeface="Comic Sans MS"/>
+                <a:cs typeface="Comic Sans MS"/>
+              </a:rPr>
+              <a:t>Hand 1</a:t>
+            </a:r>
+            <a:r>
+              <a:rPr lang="nl-NL" dirty="0">
+                <a:latin typeface="Comic Sans MS"/>
+                <a:cs typeface="Comic Sans MS"/>
+              </a:rPr>
+              <a:t>’ en in het tweede blok ‘</a:t>
+            </a:r>
+            <a:r>
+              <a:rPr lang="nl-NL" dirty="0">
+                <a:solidFill>
+                  <a:srgbClr val="1F90DB"/>
+                </a:solidFill>
+                <a:latin typeface="Comic Sans MS"/>
+                <a:cs typeface="Comic Sans MS"/>
+              </a:rPr>
+              <a:t>Hand 2</a:t>
+            </a:r>
+            <a:r>
+              <a:rPr lang="nl-NL" dirty="0">
+                <a:latin typeface="Comic Sans MS"/>
+                <a:cs typeface="Comic Sans MS"/>
+              </a:rPr>
+              <a:t>’.</a:t>
+            </a:r>
+          </a:p>
+          <a:p>
             <a:endParaRPr lang="nl-NL" dirty="0">
               <a:latin typeface="Comic Sans MS"/>
               <a:cs typeface="Comic Sans MS"/>
             </a:endParaRPr>
           </a:p>
           <a:p>
-            <a:endParaRPr lang="nl-NL" dirty="0" smtClean="0">
-              <a:latin typeface="Comic Sans MS"/>
-              <a:cs typeface="Comic Sans MS"/>
-            </a:endParaRPr>
-          </a:p>
-          <a:p>
-            <a:r>
-              <a:rPr lang="nl-NL" dirty="0" smtClean="0">
-                <a:latin typeface="Comic Sans MS"/>
-                <a:cs typeface="Comic Sans MS"/>
-              </a:rPr>
-              <a:t>Klik </a:t>
-            </a:r>
-            <a:r>
-              <a:rPr lang="nl-NL" dirty="0">
-                <a:latin typeface="Comic Sans MS"/>
-                <a:cs typeface="Comic Sans MS"/>
-              </a:rPr>
-              <a:t>op </a:t>
-            </a:r>
-            <a:r>
-              <a:rPr lang="nl-NL" dirty="0" smtClean="0">
-                <a:latin typeface="Comic Sans MS"/>
-                <a:cs typeface="Comic Sans MS"/>
-              </a:rPr>
-              <a:t>‘</a:t>
-            </a:r>
-            <a:r>
-              <a:rPr lang="nl-NL" dirty="0" smtClean="0">
-                <a:solidFill>
-                  <a:srgbClr val="1F90DB"/>
-                </a:solidFill>
-                <a:latin typeface="Comic Sans MS"/>
-                <a:cs typeface="Comic Sans MS"/>
-              </a:rPr>
-              <a:t>Waarnemen</a:t>
-            </a:r>
-            <a:r>
-              <a:rPr lang="nl-NL" dirty="0" smtClean="0">
-                <a:latin typeface="Comic Sans MS"/>
-                <a:cs typeface="Comic Sans MS"/>
-              </a:rPr>
-              <a:t>’ </a:t>
-            </a:r>
-            <a:r>
-              <a:rPr lang="nl-NL" dirty="0">
-                <a:latin typeface="Comic Sans MS"/>
-                <a:cs typeface="Comic Sans MS"/>
-              </a:rPr>
-              <a:t>bouwstenen.</a:t>
-            </a:r>
-          </a:p>
-          <a:p>
-            <a:r>
-              <a:rPr lang="nl-NL" dirty="0">
-                <a:latin typeface="Comic Sans MS"/>
-                <a:cs typeface="Comic Sans MS"/>
-              </a:rPr>
-              <a:t>Sleep </a:t>
-            </a:r>
-            <a:r>
-              <a:rPr lang="nl-NL" dirty="0" smtClean="0">
-                <a:latin typeface="Comic Sans MS"/>
-                <a:cs typeface="Comic Sans MS"/>
-              </a:rPr>
-              <a:t>twee keer de </a:t>
-            </a:r>
-            <a:r>
-              <a:rPr lang="nl-NL" dirty="0">
-                <a:latin typeface="Comic Sans MS"/>
-                <a:cs typeface="Comic Sans MS"/>
-              </a:rPr>
-              <a:t>bouwsteen </a:t>
-            </a:r>
-            <a:r>
-              <a:rPr lang="nl-NL" dirty="0" smtClean="0">
-                <a:latin typeface="Comic Sans MS"/>
-                <a:cs typeface="Comic Sans MS"/>
-              </a:rPr>
-              <a:t>‘</a:t>
-            </a:r>
-            <a:r>
-              <a:rPr lang="nl-NL" dirty="0" smtClean="0">
-                <a:solidFill>
-                  <a:srgbClr val="1F90DB"/>
-                </a:solidFill>
-                <a:latin typeface="Comic Sans MS"/>
-                <a:cs typeface="Comic Sans MS"/>
-              </a:rPr>
-              <a:t>raak ik ?</a:t>
-            </a:r>
-            <a:r>
-              <a:rPr lang="nl-NL" dirty="0" smtClean="0">
-                <a:latin typeface="Comic Sans MS"/>
-                <a:cs typeface="Comic Sans MS"/>
-              </a:rPr>
-              <a:t>’ </a:t>
-            </a:r>
-            <a:r>
-              <a:rPr lang="nl-NL" dirty="0">
-                <a:latin typeface="Comic Sans MS"/>
-                <a:cs typeface="Comic Sans MS"/>
-              </a:rPr>
-              <a:t>naar het programma veld en plaats </a:t>
-            </a:r>
-            <a:r>
-              <a:rPr lang="nl-NL" dirty="0" smtClean="0">
-                <a:latin typeface="Comic Sans MS"/>
-                <a:cs typeface="Comic Sans MS"/>
-              </a:rPr>
-              <a:t>ze in de velden links en rechts van de of. Klik op het pijltje en kies in het eerste blok ‘</a:t>
-            </a:r>
-            <a:r>
-              <a:rPr lang="nl-NL" dirty="0" smtClean="0">
-                <a:solidFill>
-                  <a:srgbClr val="1F90DB"/>
-                </a:solidFill>
-                <a:latin typeface="Comic Sans MS"/>
-                <a:cs typeface="Comic Sans MS"/>
-              </a:rPr>
-              <a:t>Hand 1</a:t>
-            </a:r>
-            <a:r>
-              <a:rPr lang="nl-NL" dirty="0" smtClean="0">
-                <a:latin typeface="Comic Sans MS"/>
-                <a:cs typeface="Comic Sans MS"/>
-              </a:rPr>
-              <a:t>’ en in het tweede blok ‘</a:t>
-            </a:r>
-            <a:r>
-              <a:rPr lang="nl-NL" dirty="0" smtClean="0">
-                <a:solidFill>
-                  <a:srgbClr val="1F90DB"/>
-                </a:solidFill>
-                <a:latin typeface="Comic Sans MS"/>
-                <a:cs typeface="Comic Sans MS"/>
-              </a:rPr>
-              <a:t>Hand 2</a:t>
-            </a:r>
-            <a:r>
-              <a:rPr lang="nl-NL" dirty="0" smtClean="0">
-                <a:latin typeface="Comic Sans MS"/>
-                <a:cs typeface="Comic Sans MS"/>
-              </a:rPr>
-              <a:t>’.</a:t>
-            </a:r>
-          </a:p>
-          <a:p>
-            <a:endParaRPr lang="nl-NL" dirty="0">
-              <a:latin typeface="Comic Sans MS"/>
-              <a:cs typeface="Comic Sans MS"/>
-            </a:endParaRPr>
-          </a:p>
-          <a:p>
-            <a:r>
-              <a:rPr lang="nl-NL" dirty="0" smtClean="0">
+            <a:r>
+              <a:rPr lang="nl-NL" dirty="0">
                 <a:latin typeface="Comic Sans MS"/>
                 <a:cs typeface="Comic Sans MS"/>
               </a:rPr>
@@ -4783,13 +4667,6 @@
   <p:clrMapOvr>
     <a:masterClrMapping/>
   </p:clrMapOvr>
-  <p:timing>
-    <p:tnLst>
-      <p:par>
-        <p:cTn xmlns:p14="http://schemas.microsoft.com/office/powerpoint/2010/main" id="1" dur="indefinite" restart="never" nodeType="tmRoot"/>
-      </p:par>
-    </p:tnLst>
-  </p:timing>
 </p:sld>
 </file>
 
@@ -4832,16 +4709,12 @@
           <a:p>
             <a:pPr algn="l"/>
             <a:r>
-              <a:rPr lang="en-US" dirty="0" smtClean="0">
+              <a:rPr lang="en-US" dirty="0">
                 <a:latin typeface="Comic Sans MS"/>
                 <a:cs typeface="Comic Sans MS"/>
               </a:rPr>
               <a:t>Bongo</a:t>
             </a:r>
-            <a:endParaRPr lang="en-US" dirty="0">
-              <a:latin typeface="Comic Sans MS"/>
-              <a:cs typeface="Comic Sans MS"/>
-            </a:endParaRPr>
           </a:p>
         </p:txBody>
       </p:sp>
@@ -4913,30 +4786,26 @@
           <a:lstStyle/>
           <a:p>
             <a:r>
-              <a:rPr lang="nl-NL" dirty="0" smtClean="0">
+              <a:rPr lang="nl-NL" dirty="0">
                 <a:latin typeface="Comic Sans MS"/>
                 <a:cs typeface="Comic Sans MS"/>
               </a:rPr>
               <a:t>We gaan nu een danser toevoegen die gaat bewegen op het ritme van de drum. Dit doen we door een </a:t>
             </a:r>
             <a:r>
-              <a:rPr lang="nl-NL" dirty="0" err="1" smtClean="0">
+              <a:rPr lang="nl-NL" dirty="0" err="1">
                 <a:latin typeface="Comic Sans MS"/>
                 <a:cs typeface="Comic Sans MS"/>
               </a:rPr>
               <a:t>sprite</a:t>
             </a:r>
             <a:r>
-              <a:rPr lang="nl-NL" dirty="0" smtClean="0">
+              <a:rPr lang="nl-NL" dirty="0">
                 <a:latin typeface="Comic Sans MS"/>
                 <a:cs typeface="Comic Sans MS"/>
               </a:rPr>
               <a:t> toe te voegen.</a:t>
             </a:r>
-            <a:endParaRPr lang="nl-NL" dirty="0">
-              <a:latin typeface="Comic Sans MS"/>
-              <a:cs typeface="Comic Sans MS"/>
-            </a:endParaRPr>
           </a:p>
         </p:txBody>
       </p:sp>
@@ -4986,7 +4855,13 @@
       </p:sp>
       <p:pic>
         <p:nvPicPr>
-          <p:cNvPr id="9" name="Tijdelijke aanduiding voor inhoud 8"/>
+          <p:cNvPr id="13" name="Tijdelijke aanduiding voor inhoud 12">
+            <a:extLst>
+              <a:ext uri="{FF2B5EF4-FFF2-40B4-BE49-F238E27FC236}">
+                <a16:creationId xmlns:a16="http://schemas.microsoft.com/office/drawing/2014/main" id="{BBC83CD9-CB0F-4505-994E-E87323AD3E96}"/>
+              </a:ext>
+            </a:extLst>
+          </p:cNvPr>
           <p:cNvPicPr>
             <a:picLocks noGrp="1" noChangeAspect="1"/>
           </p:cNvPicPr>
@@ -4994,15 +4869,16 @@
             <p:ph idx="1"/>
           </p:nvPr>
         </p:nvPicPr>
-        <p:blipFill rotWithShape="1">
+        <p:blipFill>
           <a:blip r:embed="rId2"/>
-          <a:srcRect t="2937" b="5381"/>
-          <a:stretch/>
+          <a:stretch>
+            <a:fillRect/>
+          </a:stretch>
         </p:blipFill>
         <p:spPr>
           <a:xfrm>
-            <a:off x="1132678" y="2037283"/>
-            <a:ext cx="7236622" cy="4088879"/>
+            <a:off x="747085" y="2026042"/>
+            <a:ext cx="7181648" cy="4334231"/>
           </a:xfrm>
         </p:spPr>
       </p:pic>
@@ -5016,13 +4892,6 @@
   <p:clrMapOvr>
     <a:masterClrMapping/>
   </p:clrMapOvr>
-  <p:timing>
-    <p:tnLst>
-      <p:par>
-        <p:cTn xmlns:p14="http://schemas.microsoft.com/office/powerpoint/2010/main" id="1" dur="indefinite" restart="never" nodeType="tmRoot"/>
-      </p:par>
-    </p:tnLst>
-  </p:timing>
 </p:sld>
 </file>
 
@@ -5065,16 +4934,12 @@
           <a:p>
             <a:pPr algn="l"/>
             <a:r>
-              <a:rPr lang="en-US" dirty="0" smtClean="0">
+              <a:rPr lang="en-US" dirty="0">
                 <a:latin typeface="Comic Sans MS"/>
                 <a:cs typeface="Comic Sans MS"/>
               </a:rPr>
               <a:t>Bongo</a:t>
             </a:r>
-            <a:endParaRPr lang="en-US" dirty="0">
-              <a:latin typeface="Comic Sans MS"/>
-              <a:cs typeface="Comic Sans MS"/>
-            </a:endParaRPr>
           </a:p>
         </p:txBody>
       </p:sp>
@@ -5146,35 +5011,35 @@
           <a:lstStyle/>
           <a:p>
             <a:r>
-              <a:rPr lang="nl-NL" dirty="0" smtClean="0">
+              <a:rPr lang="nl-NL" dirty="0">
                 <a:latin typeface="Comic Sans MS"/>
                 <a:cs typeface="Comic Sans MS"/>
               </a:rPr>
               <a:t>Een nieuwe </a:t>
             </a:r>
             <a:r>
-              <a:rPr lang="nl-NL" dirty="0" err="1" smtClean="0">
+              <a:rPr lang="nl-NL" dirty="0" err="1">
                 <a:latin typeface="Comic Sans MS"/>
                 <a:cs typeface="Comic Sans MS"/>
               </a:rPr>
               <a:t>sprite</a:t>
             </a:r>
             <a:r>
-              <a:rPr lang="nl-NL" dirty="0" smtClean="0">
+              <a:rPr lang="nl-NL" dirty="0">
                 <a:latin typeface="Comic Sans MS"/>
                 <a:cs typeface="Comic Sans MS"/>
               </a:rPr>
               <a:t> kun je toevoegen door op het mannetje in het </a:t>
             </a:r>
             <a:r>
-              <a:rPr lang="nl-NL" dirty="0" err="1" smtClean="0">
+              <a:rPr lang="nl-NL" dirty="0" err="1">
                 <a:latin typeface="Comic Sans MS"/>
                 <a:cs typeface="Comic Sans MS"/>
               </a:rPr>
               <a:t>sprite</a:t>
             </a:r>
             <a:r>
-              <a:rPr lang="nl-NL" dirty="0" smtClean="0">
+              <a:rPr lang="nl-NL" dirty="0">
                 <a:latin typeface="Comic Sans MS"/>
                 <a:cs typeface="Comic Sans MS"/>
               </a:rPr>
@@ -5192,7 +5057,7 @@
         <p:spPr>
           <a:xfrm>
             <a:off x="5106609" y="3705609"/>
-            <a:ext cx="3398762" cy="1200329"/>
+            <a:ext cx="3398762" cy="923330"/>
           </a:xfrm>
           <a:prstGeom prst="rect">
             <a:avLst/>
@@ -5206,16 +5071,12 @@
           <a:lstStyle/>
           <a:p>
             <a:r>
-              <a:rPr lang="nl-NL" dirty="0" smtClean="0">
-                <a:latin typeface="Comic Sans MS"/>
-                <a:cs typeface="Comic Sans MS"/>
-              </a:rPr>
-              <a:t>Ga vervolgens op naar het thema ‘Muziek en dans’ en kies een van de Hip-Hop figuren uit.</a:t>
-            </a:r>
-            <a:endParaRPr lang="nl-NL" dirty="0">
-              <a:latin typeface="Comic Sans MS"/>
-              <a:cs typeface="Comic Sans MS"/>
-            </a:endParaRPr>
+              <a:rPr lang="nl-NL" dirty="0">
+                <a:latin typeface="Comic Sans MS"/>
+                <a:cs typeface="Comic Sans MS"/>
+              </a:rPr>
+              <a:t>Ga vervolgens op naar het thema ‘Dance’ en kies een van de Hip-Hop figuren uit.</a:t>
+            </a:r>
           </a:p>
         </p:txBody>
       </p:sp>
@@ -5287,7 +5148,13 @@
       </p:sp>
       <p:pic>
         <p:nvPicPr>
-          <p:cNvPr id="7" name="Afbeelding 6"/>
+          <p:cNvPr id="10" name="Afbeelding 9">
+            <a:extLst>
+              <a:ext uri="{FF2B5EF4-FFF2-40B4-BE49-F238E27FC236}">
+                <a16:creationId xmlns:a16="http://schemas.microsoft.com/office/drawing/2014/main" id="{9193F08E-A086-47EA-9517-89B82821345C}"/>
+              </a:ext>
+            </a:extLst>
+          </p:cNvPr>
           <p:cNvPicPr>
             <a:picLocks noChangeAspect="1"/>
           </p:cNvPicPr>
@@ -5301,8 +5168,8 @@
         </p:blipFill>
         <p:spPr>
           <a:xfrm>
-            <a:off x="215900" y="3327400"/>
-            <a:ext cx="4750344" cy="2581431"/>
+            <a:off x="410723" y="3325268"/>
+            <a:ext cx="4695886" cy="2733078"/>
           </a:xfrm>
           <a:prstGeom prst="rect">
             <a:avLst/>
@@ -5319,13 +5186,6 @@
   <p:clrMapOvr>
     <a:masterClrMapping/>
   </p:clrMapOvr>
-  <p:timing>
-    <p:tnLst>
-      <p:par>
-        <p:cTn xmlns:p14="http://schemas.microsoft.com/office/powerpoint/2010/main" id="1" dur="indefinite" restart="never" nodeType="tmRoot"/>
-      </p:par>
-    </p:tnLst>
-  </p:timing>
 </p:sld>
 </file>
 
@@ -5368,16 +5228,12 @@
           <a:p>
             <a:pPr algn="l"/>
             <a:r>
-              <a:rPr lang="en-US" dirty="0" smtClean="0">
+              <a:rPr lang="en-US" dirty="0">
                 <a:latin typeface="Comic Sans MS"/>
                 <a:cs typeface="Comic Sans MS"/>
               </a:rPr>
               <a:t>Bongo</a:t>
             </a:r>
-            <a:endParaRPr lang="en-US" dirty="0">
-              <a:latin typeface="Comic Sans MS"/>
-              <a:cs typeface="Comic Sans MS"/>
-            </a:endParaRPr>
           </a:p>
         </p:txBody>
       </p:sp>
@@ -5449,21 +5305,21 @@
           <a:lstStyle/>
           <a:p>
             <a:r>
-              <a:rPr lang="nl-NL" dirty="0" smtClean="0">
+              <a:rPr lang="nl-NL" dirty="0">
                 <a:latin typeface="Comic Sans MS"/>
                 <a:cs typeface="Comic Sans MS"/>
               </a:rPr>
               <a:t>Nu moeten we de </a:t>
             </a:r>
             <a:r>
-              <a:rPr lang="nl-NL" dirty="0" err="1" smtClean="0">
+              <a:rPr lang="nl-NL" dirty="0" err="1">
                 <a:latin typeface="Comic Sans MS"/>
                 <a:cs typeface="Comic Sans MS"/>
               </a:rPr>
               <a:t>sprite</a:t>
             </a:r>
             <a:r>
-              <a:rPr lang="nl-NL" dirty="0" smtClean="0">
+              <a:rPr lang="nl-NL" dirty="0">
                 <a:latin typeface="Comic Sans MS"/>
                 <a:cs typeface="Comic Sans MS"/>
               </a:rPr>
@@ -5478,21 +5334,21 @@
           </a:p>
           <a:p>
             <a:r>
-              <a:rPr lang="nl-NL" dirty="0" smtClean="0">
+              <a:rPr lang="nl-NL" dirty="0">
                 <a:latin typeface="Comic Sans MS"/>
                 <a:cs typeface="Comic Sans MS"/>
               </a:rPr>
               <a:t>Selecteer de drum </a:t>
             </a:r>
             <a:r>
-              <a:rPr lang="nl-NL" dirty="0" err="1" smtClean="0">
+              <a:rPr lang="nl-NL" dirty="0" err="1">
                 <a:latin typeface="Comic Sans MS"/>
                 <a:cs typeface="Comic Sans MS"/>
               </a:rPr>
               <a:t>sprite</a:t>
             </a:r>
             <a:r>
-              <a:rPr lang="nl-NL" dirty="0" smtClean="0">
+              <a:rPr lang="nl-NL" dirty="0">
                 <a:latin typeface="Comic Sans MS"/>
                 <a:cs typeface="Comic Sans MS"/>
               </a:rPr>
@@ -5511,17 +5367,10 @@
                 <a:latin typeface="Comic Sans MS"/>
                 <a:cs typeface="Comic Sans MS"/>
               </a:rPr>
-              <a:t>Klik op </a:t>
-            </a:r>
-            <a:r>
-              <a:rPr lang="nl-NL" dirty="0" smtClean="0">
-                <a:latin typeface="Comic Sans MS"/>
-                <a:cs typeface="Comic Sans MS"/>
-              </a:rPr>
-              <a:t>‘</a:t>
-            </a:r>
-            <a:r>
-              <a:rPr lang="nl-NL" dirty="0" smtClean="0">
+              <a:t>Klik op ‘</a:t>
+            </a:r>
+            <a:r>
+              <a:rPr lang="nl-NL" dirty="0">
                 <a:solidFill>
                   <a:srgbClr val="BC711C"/>
                 </a:solidFill>
@@ -5531,37 +5380,23 @@
               <a:t>Gebeurtenissen</a:t>
             </a:r>
             <a:r>
-              <a:rPr lang="nl-NL" dirty="0" smtClean="0">
-                <a:latin typeface="Comic Sans MS"/>
-                <a:cs typeface="Comic Sans MS"/>
-              </a:rPr>
-              <a:t>’ </a:t>
-            </a:r>
-            <a:r>
-              <a:rPr lang="nl-NL" dirty="0">
-                <a:latin typeface="Comic Sans MS"/>
-                <a:cs typeface="Comic Sans MS"/>
-              </a:rPr>
-              <a:t>bouwstenen.</a:t>
-            </a:r>
-          </a:p>
-          <a:p>
-            <a:r>
-              <a:rPr lang="nl-NL" dirty="0">
-                <a:latin typeface="Comic Sans MS"/>
-                <a:cs typeface="Comic Sans MS"/>
-              </a:rPr>
-              <a:t>Sleep dan de bouwsteen </a:t>
-            </a:r>
-            <a:r>
-              <a:rPr lang="nl-NL" dirty="0" smtClean="0">
-                <a:latin typeface="Comic Sans MS"/>
-                <a:cs typeface="Comic Sans MS"/>
-              </a:rPr>
-              <a:t>‘</a:t>
-            </a:r>
-            <a:r>
-              <a:rPr lang="nl-NL" dirty="0" smtClean="0">
+              <a:rPr lang="nl-NL" dirty="0">
+                <a:latin typeface="Comic Sans MS"/>
+                <a:cs typeface="Comic Sans MS"/>
+              </a:rPr>
+              <a:t>’ bouwstenen.</a:t>
+            </a:r>
+          </a:p>
+          <a:p>
+            <a:r>
+              <a:rPr lang="nl-NL" dirty="0">
+                <a:latin typeface="Comic Sans MS"/>
+                <a:cs typeface="Comic Sans MS"/>
+              </a:rPr>
+              <a:t>Sleep dan de bouwsteen ‘</a:t>
+            </a:r>
+            <a:r>
+              <a:rPr lang="nl-NL" dirty="0">
                 <a:solidFill>
                   <a:srgbClr val="BC711C"/>
                 </a:solidFill>
@@ -5571,25 +5406,11 @@
               <a:t>zend signaal</a:t>
             </a:r>
             <a:r>
-              <a:rPr lang="nl-NL" dirty="0" smtClean="0">
-                <a:latin typeface="Comic Sans MS"/>
-                <a:cs typeface="Comic Sans MS"/>
-              </a:rPr>
-              <a:t>’ </a:t>
-            </a:r>
-            <a:r>
-              <a:rPr lang="nl-NL" dirty="0">
-                <a:latin typeface="Comic Sans MS"/>
-                <a:cs typeface="Comic Sans MS"/>
-              </a:rPr>
-              <a:t>naar het programma veld en plaats hem </a:t>
-            </a:r>
-            <a:r>
-              <a:rPr lang="nl-NL" dirty="0" smtClean="0">
-                <a:latin typeface="Comic Sans MS"/>
-                <a:cs typeface="Comic Sans MS"/>
-              </a:rPr>
-              <a:t>tussen de speel slagwerk en de wacht tot stenen.</a:t>
+              <a:rPr lang="nl-NL" dirty="0">
+                <a:latin typeface="Comic Sans MS"/>
+                <a:cs typeface="Comic Sans MS"/>
+              </a:rPr>
+              <a:t>’ naar het programma veld en plaats hem tussen de speel slagwerk en de wacht tot stenen.</a:t>
             </a:r>
           </a:p>
           <a:p>
@@ -5600,45 +5421,41 @@
           </a:p>
           <a:p>
             <a:r>
-              <a:rPr lang="nl-NL" dirty="0" smtClean="0">
+              <a:rPr lang="nl-NL" dirty="0">
                 <a:latin typeface="Comic Sans MS"/>
                 <a:cs typeface="Comic Sans MS"/>
               </a:rPr>
               <a:t>Klik op ‘</a:t>
             </a:r>
             <a:r>
-              <a:rPr lang="nl-NL" dirty="0" err="1" smtClean="0">
+              <a:rPr lang="nl-NL" dirty="0" err="1">
                 <a:latin typeface="Comic Sans MS"/>
                 <a:cs typeface="Comic Sans MS"/>
               </a:rPr>
               <a:t>message</a:t>
             </a:r>
             <a:r>
-              <a:rPr lang="nl-NL" dirty="0" smtClean="0">
+              <a:rPr lang="nl-NL" dirty="0">
                 <a:latin typeface="Comic Sans MS"/>
                 <a:cs typeface="Comic Sans MS"/>
               </a:rPr>
               <a:t> 1’ en kies ‘nieuw bericht…’, noem het bericht ‘drum geraakt’. Klik op OK</a:t>
             </a:r>
+          </a:p>
+          <a:p>
             <a:endParaRPr lang="nl-NL" dirty="0">
               <a:latin typeface="Comic Sans MS"/>
               <a:cs typeface="Comic Sans MS"/>
             </a:endParaRPr>
           </a:p>
           <a:p>
-            <a:endParaRPr lang="nl-NL" dirty="0" smtClean="0">
-              <a:latin typeface="Comic Sans MS"/>
-              <a:cs typeface="Comic Sans MS"/>
-            </a:endParaRPr>
-          </a:p>
-          <a:p>
             <a:endParaRPr lang="nl-NL" dirty="0">
               <a:latin typeface="Comic Sans MS"/>
               <a:cs typeface="Comic Sans MS"/>
             </a:endParaRPr>
           </a:p>
           <a:p>
-            <a:endParaRPr lang="nl-NL" dirty="0" smtClean="0">
+            <a:endParaRPr lang="nl-NL" dirty="0">
               <a:latin typeface="Comic Sans MS"/>
               <a:cs typeface="Comic Sans MS"/>
             </a:endParaRPr>
@@ -5859,13 +5676,6 @@
   <p:clrMapOvr>
     <a:masterClrMapping/>
   </p:clrMapOvr>
-  <p:timing>
-    <p:tnLst>
-      <p:par>
-        <p:cTn xmlns:p14="http://schemas.microsoft.com/office/powerpoint/2010/main" id="1" dur="indefinite" restart="never" nodeType="tmRoot"/>
-      </p:par>
-    </p:tnLst>
-  </p:timing>
 </p:sld>
 </file>
 
@@ -5908,16 +5718,12 @@
           <a:p>
             <a:pPr algn="l"/>
             <a:r>
-              <a:rPr lang="en-US" dirty="0" smtClean="0">
+              <a:rPr lang="en-US" dirty="0">
                 <a:latin typeface="Comic Sans MS"/>
                 <a:cs typeface="Comic Sans MS"/>
               </a:rPr>
               <a:t>Bongo</a:t>
             </a:r>
-            <a:endParaRPr lang="en-US" dirty="0">
-              <a:latin typeface="Comic Sans MS"/>
-              <a:cs typeface="Comic Sans MS"/>
-            </a:endParaRPr>
           </a:p>
         </p:txBody>
       </p:sp>
@@ -5989,7 +5795,7 @@
           <a:lstStyle/>
           <a:p>
             <a:r>
-              <a:rPr lang="nl-NL" dirty="0" smtClean="0">
+              <a:rPr lang="nl-NL" dirty="0">
                 <a:latin typeface="Comic Sans MS"/>
                 <a:cs typeface="Comic Sans MS"/>
               </a:rPr>
@@ -6004,21 +5810,21 @@
           </a:p>
           <a:p>
             <a:r>
-              <a:rPr lang="nl-NL" dirty="0" smtClean="0">
+              <a:rPr lang="nl-NL" dirty="0">
                 <a:latin typeface="Comic Sans MS"/>
                 <a:cs typeface="Comic Sans MS"/>
               </a:rPr>
               <a:t>Selecteer de </a:t>
             </a:r>
             <a:r>
-              <a:rPr lang="nl-NL" dirty="0" err="1" smtClean="0">
+              <a:rPr lang="nl-NL" dirty="0" err="1">
                 <a:latin typeface="Comic Sans MS"/>
                 <a:cs typeface="Comic Sans MS"/>
               </a:rPr>
               <a:t>sprite</a:t>
             </a:r>
             <a:r>
-              <a:rPr lang="nl-NL" dirty="0" smtClean="0">
+              <a:rPr lang="nl-NL" dirty="0">
                 <a:latin typeface="Comic Sans MS"/>
                 <a:cs typeface="Comic Sans MS"/>
               </a:rPr>
@@ -6037,17 +5843,10 @@
                 <a:latin typeface="Comic Sans MS"/>
                 <a:cs typeface="Comic Sans MS"/>
               </a:rPr>
-              <a:t>Klik op </a:t>
-            </a:r>
-            <a:r>
-              <a:rPr lang="nl-NL" dirty="0" smtClean="0">
-                <a:latin typeface="Comic Sans MS"/>
-                <a:cs typeface="Comic Sans MS"/>
-              </a:rPr>
-              <a:t>‘</a:t>
-            </a:r>
-            <a:r>
-              <a:rPr lang="nl-NL" dirty="0" smtClean="0">
+              <a:t>Klik op ‘</a:t>
+            </a:r>
+            <a:r>
+              <a:rPr lang="nl-NL" dirty="0">
                 <a:solidFill>
                   <a:srgbClr val="BC711C"/>
                 </a:solidFill>
@@ -6057,37 +5856,23 @@
               <a:t>Gebeurtenissen</a:t>
             </a:r>
             <a:r>
-              <a:rPr lang="nl-NL" dirty="0" smtClean="0">
-                <a:latin typeface="Comic Sans MS"/>
-                <a:cs typeface="Comic Sans MS"/>
-              </a:rPr>
-              <a:t>’ </a:t>
-            </a:r>
-            <a:r>
-              <a:rPr lang="nl-NL" dirty="0">
-                <a:latin typeface="Comic Sans MS"/>
-                <a:cs typeface="Comic Sans MS"/>
-              </a:rPr>
-              <a:t>bouwstenen.</a:t>
-            </a:r>
-          </a:p>
-          <a:p>
-            <a:r>
-              <a:rPr lang="nl-NL" dirty="0">
-                <a:latin typeface="Comic Sans MS"/>
-                <a:cs typeface="Comic Sans MS"/>
-              </a:rPr>
-              <a:t>Sleep dan de bouwsteen </a:t>
-            </a:r>
-            <a:r>
-              <a:rPr lang="nl-NL" dirty="0" smtClean="0">
-                <a:latin typeface="Comic Sans MS"/>
-                <a:cs typeface="Comic Sans MS"/>
-              </a:rPr>
-              <a:t>‘</a:t>
-            </a:r>
-            <a:r>
-              <a:rPr lang="nl-NL" dirty="0" smtClean="0">
+              <a:rPr lang="nl-NL" dirty="0">
+                <a:latin typeface="Comic Sans MS"/>
+                <a:cs typeface="Comic Sans MS"/>
+              </a:rPr>
+              <a:t>’ bouwstenen.</a:t>
+            </a:r>
+          </a:p>
+          <a:p>
+            <a:r>
+              <a:rPr lang="nl-NL" dirty="0">
+                <a:latin typeface="Comic Sans MS"/>
+                <a:cs typeface="Comic Sans MS"/>
+              </a:rPr>
+              <a:t>Sleep dan de bouwsteen ‘</a:t>
+            </a:r>
+            <a:r>
+              <a:rPr lang="nl-NL" dirty="0">
                 <a:solidFill>
                   <a:srgbClr val="BC711C"/>
                 </a:solidFill>
@@ -6097,25 +5882,11 @@
               <a:t>wanneer ik signaal [] ontvang</a:t>
             </a:r>
             <a:r>
-              <a:rPr lang="nl-NL" dirty="0" smtClean="0">
-                <a:latin typeface="Comic Sans MS"/>
-                <a:cs typeface="Comic Sans MS"/>
-              </a:rPr>
-              <a:t>’ </a:t>
-            </a:r>
-            <a:r>
-              <a:rPr lang="nl-NL" dirty="0">
-                <a:latin typeface="Comic Sans MS"/>
-                <a:cs typeface="Comic Sans MS"/>
-              </a:rPr>
-              <a:t>naar het programma </a:t>
-            </a:r>
-            <a:r>
-              <a:rPr lang="nl-NL" dirty="0" smtClean="0">
-                <a:latin typeface="Comic Sans MS"/>
-                <a:cs typeface="Comic Sans MS"/>
-              </a:rPr>
-              <a:t>veld. Selecteer het signaal ‘drum geraakt’ in de steen.</a:t>
+              <a:rPr lang="nl-NL" dirty="0">
+                <a:latin typeface="Comic Sans MS"/>
+                <a:cs typeface="Comic Sans MS"/>
+              </a:rPr>
+              <a:t>’ naar het programma veld. Selecteer het signaal ‘drum geraakt’ in de steen.</a:t>
             </a:r>
           </a:p>
           <a:p>
@@ -6130,17 +5901,10 @@
                 <a:latin typeface="Comic Sans MS"/>
                 <a:cs typeface="Comic Sans MS"/>
               </a:rPr>
-              <a:t>Klik op </a:t>
-            </a:r>
-            <a:r>
-              <a:rPr lang="nl-NL" dirty="0" smtClean="0">
-                <a:latin typeface="Comic Sans MS"/>
-                <a:cs typeface="Comic Sans MS"/>
-              </a:rPr>
-              <a:t>‘</a:t>
-            </a:r>
-            <a:r>
-              <a:rPr lang="nl-NL" dirty="0" err="1" smtClean="0">
+              <a:t>Klik op ‘</a:t>
+            </a:r>
+            <a:r>
+              <a:rPr lang="nl-NL" dirty="0" err="1">
                 <a:solidFill>
                   <a:srgbClr val="7633D1"/>
                 </a:solidFill>
@@ -6150,37 +5914,23 @@
               <a:t>Uiterlijken</a:t>
             </a:r>
             <a:r>
-              <a:rPr lang="nl-NL" dirty="0" smtClean="0">
-                <a:latin typeface="Comic Sans MS"/>
-                <a:cs typeface="Comic Sans MS"/>
-              </a:rPr>
-              <a:t>’ </a:t>
-            </a:r>
-            <a:r>
-              <a:rPr lang="nl-NL" dirty="0">
-                <a:latin typeface="Comic Sans MS"/>
-                <a:cs typeface="Comic Sans MS"/>
-              </a:rPr>
-              <a:t>bouwstenen.</a:t>
-            </a:r>
-          </a:p>
-          <a:p>
-            <a:r>
-              <a:rPr lang="nl-NL" dirty="0">
-                <a:latin typeface="Comic Sans MS"/>
-                <a:cs typeface="Comic Sans MS"/>
-              </a:rPr>
-              <a:t>Sleep dan de bouwsteen </a:t>
-            </a:r>
-            <a:r>
-              <a:rPr lang="nl-NL" dirty="0" smtClean="0">
-                <a:latin typeface="Comic Sans MS"/>
-                <a:cs typeface="Comic Sans MS"/>
-              </a:rPr>
-              <a:t>‘</a:t>
-            </a:r>
-            <a:r>
-              <a:rPr lang="nl-NL" dirty="0" smtClean="0">
+              <a:rPr lang="nl-NL" dirty="0">
+                <a:latin typeface="Comic Sans MS"/>
+                <a:cs typeface="Comic Sans MS"/>
+              </a:rPr>
+              <a:t>’ bouwstenen.</a:t>
+            </a:r>
+          </a:p>
+          <a:p>
+            <a:r>
+              <a:rPr lang="nl-NL" dirty="0">
+                <a:latin typeface="Comic Sans MS"/>
+                <a:cs typeface="Comic Sans MS"/>
+              </a:rPr>
+              <a:t>Sleep dan de bouwsteen ‘</a:t>
+            </a:r>
+            <a:r>
+              <a:rPr lang="nl-NL" dirty="0">
                 <a:solidFill>
                   <a:srgbClr val="7633D1"/>
                 </a:solidFill>
@@ -6190,25 +5940,11 @@
               <a:t>volgende uiterlijk</a:t>
             </a:r>
             <a:r>
-              <a:rPr lang="nl-NL" dirty="0" smtClean="0">
-                <a:latin typeface="Comic Sans MS"/>
-                <a:cs typeface="Comic Sans MS"/>
-              </a:rPr>
-              <a:t>’ </a:t>
-            </a:r>
-            <a:r>
-              <a:rPr lang="nl-NL" dirty="0">
-                <a:latin typeface="Comic Sans MS"/>
-                <a:cs typeface="Comic Sans MS"/>
-              </a:rPr>
-              <a:t>naar het programma </a:t>
-            </a:r>
-            <a:r>
-              <a:rPr lang="nl-NL" dirty="0" smtClean="0">
-                <a:latin typeface="Comic Sans MS"/>
-                <a:cs typeface="Comic Sans MS"/>
-              </a:rPr>
-              <a:t>veld en sluit het aan onder de ‘wanneer ik signaal [] ontvang’-steen.</a:t>
+              <a:rPr lang="nl-NL" dirty="0">
+                <a:latin typeface="Comic Sans MS"/>
+                <a:cs typeface="Comic Sans MS"/>
+              </a:rPr>
+              <a:t>’ naar het programma veld en sluit het aan onder de ‘wanneer ik signaal [] ontvang’-steen.</a:t>
             </a:r>
           </a:p>
           <a:p>
@@ -6218,7 +5954,7 @@
             </a:endParaRPr>
           </a:p>
           <a:p>
-            <a:endParaRPr lang="nl-NL" dirty="0" smtClean="0">
+            <a:endParaRPr lang="nl-NL" dirty="0">
               <a:latin typeface="Comic Sans MS"/>
               <a:cs typeface="Comic Sans MS"/>
             </a:endParaRPr>
@@ -6371,13 +6107,6 @@
   <p:clrMapOvr>
     <a:masterClrMapping/>
   </p:clrMapOvr>
-  <p:timing>
-    <p:tnLst>
-      <p:par>
-        <p:cTn xmlns:p14="http://schemas.microsoft.com/office/powerpoint/2010/main" id="1" dur="indefinite" restart="never" nodeType="tmRoot"/>
-      </p:par>
-    </p:tnLst>
-  </p:timing>
 </p:sld>
 </file>
 
@@ -6420,16 +6149,12 @@
           <a:p>
             <a:pPr algn="l"/>
             <a:r>
-              <a:rPr lang="en-US" dirty="0" smtClean="0">
+              <a:rPr lang="en-US" dirty="0">
                 <a:latin typeface="Comic Sans MS"/>
                 <a:cs typeface="Comic Sans MS"/>
               </a:rPr>
               <a:t>Bongo</a:t>
             </a:r>
-            <a:endParaRPr lang="en-US" dirty="0">
-              <a:latin typeface="Comic Sans MS"/>
-              <a:cs typeface="Comic Sans MS"/>
-            </a:endParaRPr>
           </a:p>
         </p:txBody>
       </p:sp>
@@ -6501,7 +6226,7 @@
           <a:lstStyle/>
           <a:p>
             <a:r>
-              <a:rPr lang="nl-NL" dirty="0" smtClean="0">
+              <a:rPr lang="nl-NL" dirty="0">
                 <a:latin typeface="Comic Sans MS"/>
                 <a:cs typeface="Comic Sans MS"/>
               </a:rPr>
@@ -6516,7 +6241,7 @@
           </a:p>
           <a:p>
             <a:r>
-              <a:rPr lang="nl-NL" dirty="0" smtClean="0">
+              <a:rPr lang="nl-NL" dirty="0">
                 <a:latin typeface="Comic Sans MS"/>
                 <a:cs typeface="Comic Sans MS"/>
               </a:rPr>
@@ -6529,7 +6254,7 @@
               <a:buChar char="-"/>
             </a:pPr>
             <a:r>
-              <a:rPr lang="nl-NL" dirty="0" smtClean="0">
+              <a:rPr lang="nl-NL" dirty="0">
                 <a:latin typeface="Comic Sans MS"/>
                 <a:cs typeface="Comic Sans MS"/>
               </a:rPr>
@@ -6542,22 +6267,24 @@
               <a:buChar char="-"/>
             </a:pPr>
             <a:r>
-              <a:rPr lang="nl-NL" dirty="0" smtClean="0">
+              <a:rPr lang="nl-NL" dirty="0">
                 <a:latin typeface="Comic Sans MS"/>
                 <a:cs typeface="Comic Sans MS"/>
               </a:rPr>
               <a:t>Meer drums toe te voegen met verschillende geluiden</a:t>
             </a:r>
-            <a:endParaRPr lang="nl-NL" dirty="0">
-              <a:latin typeface="Comic Sans MS"/>
-              <a:cs typeface="Comic Sans MS"/>
-            </a:endParaRPr>
           </a:p>
         </p:txBody>
       </p:sp>
       <p:pic>
         <p:nvPicPr>
-          <p:cNvPr id="6" name="Afbeelding 5"/>
+          <p:cNvPr id="7" name="Afbeelding 6">
+            <a:extLst>
+              <a:ext uri="{FF2B5EF4-FFF2-40B4-BE49-F238E27FC236}">
+                <a16:creationId xmlns:a16="http://schemas.microsoft.com/office/drawing/2014/main" id="{DB9D5E4B-8836-4C38-AA19-A4F9EA8025D0}"/>
+              </a:ext>
+            </a:extLst>
+          </p:cNvPr>
           <p:cNvPicPr>
             <a:picLocks noChangeAspect="1"/>
           </p:cNvPicPr>
@@ -6571,8 +6298,8 @@
         </p:blipFill>
         <p:spPr>
           <a:xfrm>
-            <a:off x="4064577" y="1390952"/>
-            <a:ext cx="4801232" cy="4076700"/>
+            <a:off x="4217575" y="1390952"/>
+            <a:ext cx="4648234" cy="3867178"/>
           </a:xfrm>
           <a:prstGeom prst="rect">
             <a:avLst/>
@@ -6589,13 +6316,6 @@
   <p:clrMapOvr>
     <a:masterClrMapping/>
   </p:clrMapOvr>
-  <p:timing>
-    <p:tnLst>
-      <p:par>
-        <p:cTn xmlns:p14="http://schemas.microsoft.com/office/powerpoint/2010/main" id="1" dur="indefinite" restart="never" nodeType="tmRoot"/>
-      </p:par>
-    </p:tnLst>
-  </p:timing>
 </p:sld>
 </file>
 
@@ -6638,16 +6358,12 @@
           <a:p>
             <a:pPr algn="l"/>
             <a:r>
-              <a:rPr lang="en-US" dirty="0" smtClean="0">
+              <a:rPr lang="en-US" dirty="0">
                 <a:latin typeface="Comic Sans MS"/>
                 <a:cs typeface="Comic Sans MS"/>
               </a:rPr>
               <a:t>Bongo</a:t>
             </a:r>
-            <a:endParaRPr lang="en-US" dirty="0">
-              <a:latin typeface="Comic Sans MS"/>
-              <a:cs typeface="Comic Sans MS"/>
-            </a:endParaRPr>
           </a:p>
         </p:txBody>
       </p:sp>
@@ -6705,7 +6421,7 @@
         <p:spPr>
           <a:xfrm>
             <a:off x="411239" y="1709056"/>
-            <a:ext cx="2975428" cy="4247317"/>
+            <a:ext cx="2975428" cy="4524315"/>
           </a:xfrm>
           <a:prstGeom prst="rect">
             <a:avLst/>
@@ -6719,7 +6435,7 @@
           <a:lstStyle/>
           <a:p>
             <a:r>
-              <a:rPr lang="nl-NL" dirty="0" smtClean="0">
+              <a:rPr lang="nl-NL" dirty="0">
                 <a:latin typeface="Comic Sans MS"/>
                 <a:cs typeface="Comic Sans MS"/>
               </a:rPr>
@@ -6727,29 +6443,43 @@
             </a:r>
           </a:p>
           <a:p>
-            <a:endParaRPr lang="nl-NL" dirty="0" smtClean="0">
+            <a:endParaRPr lang="nl-NL" dirty="0">
               <a:latin typeface="Comic Sans MS"/>
               <a:cs typeface="Comic Sans MS"/>
             </a:endParaRPr>
           </a:p>
           <a:p>
             <a:r>
-              <a:rPr lang="nl-NL" dirty="0" smtClean="0">
-                <a:latin typeface="Comic Sans MS"/>
-                <a:cs typeface="Comic Sans MS"/>
-              </a:rPr>
-              <a:t>Hiervoor moet je het project ‘opdracht_bongo.sb2’ openen.</a:t>
-            </a:r>
-          </a:p>
-          <a:p>
-            <a:endParaRPr lang="nl-NL" dirty="0" smtClean="0">
+              <a:rPr lang="nl-NL" dirty="0">
+                <a:latin typeface="Comic Sans MS"/>
+                <a:cs typeface="Comic Sans MS"/>
+              </a:rPr>
+              <a:t>Hiervoor moet je het project ‘</a:t>
+            </a:r>
+            <a:r>
+              <a:rPr lang="nl-NL" dirty="0" err="1">
+                <a:latin typeface="Comic Sans MS"/>
+                <a:cs typeface="Comic Sans MS"/>
+              </a:rPr>
+              <a:t>opdracht_bongo.sbx</a:t>
+            </a:r>
+            <a:r>
+              <a:rPr lang="nl-NL" dirty="0">
+                <a:latin typeface="Comic Sans MS"/>
+                <a:cs typeface="Comic Sans MS"/>
+              </a:rPr>
+              <a:t>’ openen.</a:t>
+            </a:r>
+          </a:p>
+          <a:p>
+            <a:endParaRPr lang="nl-NL" dirty="0">
               <a:latin typeface="Comic Sans MS"/>
               <a:cs typeface="Comic Sans MS"/>
             </a:endParaRPr>
           </a:p>
           <a:p>
             <a:r>
-              <a:rPr lang="nl-NL" dirty="0" smtClean="0">
+              <a:rPr lang="nl-NL" dirty="0">
                 <a:latin typeface="Comic Sans MS"/>
                 <a:cs typeface="Comic Sans MS"/>
               </a:rPr>
@@ -6757,43 +6487,43 @@
             </a:r>
           </a:p>
           <a:p>
-            <a:endParaRPr lang="nl-NL" dirty="0" smtClean="0">
+            <a:endParaRPr lang="nl-NL" dirty="0">
               <a:latin typeface="Comic Sans MS"/>
               <a:cs typeface="Comic Sans MS"/>
             </a:endParaRPr>
           </a:p>
           <a:p>
             <a:r>
-              <a:rPr lang="nl-NL" dirty="0" smtClean="0">
-                <a:latin typeface="Comic Sans MS"/>
-                <a:cs typeface="Comic Sans MS"/>
-              </a:rPr>
-              <a:t>Bestand-&gt;Open</a:t>
-            </a:r>
-          </a:p>
-          <a:p>
-            <a:endParaRPr lang="nl-NL" dirty="0" smtClean="0">
+              <a:rPr lang="nl-NL" dirty="0">
+                <a:latin typeface="Comic Sans MS"/>
+                <a:cs typeface="Comic Sans MS"/>
+              </a:rPr>
+              <a:t>Bestand-&gt;Load Project</a:t>
+            </a:r>
+          </a:p>
+          <a:p>
+            <a:endParaRPr lang="nl-NL" dirty="0">
               <a:latin typeface="Comic Sans MS"/>
               <a:cs typeface="Comic Sans MS"/>
             </a:endParaRPr>
           </a:p>
           <a:p>
             <a:r>
-              <a:rPr lang="nl-NL" dirty="0" smtClean="0">
-                <a:latin typeface="Comic Sans MS"/>
-                <a:cs typeface="Comic Sans MS"/>
-              </a:rPr>
-              <a:t>En kies dan </a:t>
-            </a:r>
-            <a:r>
-              <a:rPr lang="nl-NL" dirty="0" smtClean="0">
-                <a:latin typeface="Comic Sans MS"/>
-                <a:cs typeface="Comic Sans MS"/>
-              </a:rPr>
-              <a:t>‘Bongo.sb2</a:t>
-            </a:r>
-            <a:r>
-              <a:rPr lang="nl-NL" dirty="0" smtClean="0">
+              <a:rPr lang="nl-NL" dirty="0">
+                <a:latin typeface="Comic Sans MS"/>
+                <a:cs typeface="Comic Sans MS"/>
+              </a:rPr>
+              <a:t>En kies dan ‘</a:t>
+            </a:r>
+            <a:r>
+              <a:rPr lang="nl-NL" dirty="0" err="1">
+                <a:latin typeface="Comic Sans MS"/>
+                <a:cs typeface="Comic Sans MS"/>
+              </a:rPr>
+              <a:t>opdracht_bongo.sbx</a:t>
+            </a:r>
+            <a:r>
+              <a:rPr lang="nl-NL" dirty="0">
                 <a:latin typeface="Comic Sans MS"/>
                 <a:cs typeface="Comic Sans MS"/>
               </a:rPr>
@@ -6804,7 +6534,13 @@
       </p:sp>
       <p:pic>
         <p:nvPicPr>
-          <p:cNvPr id="16" name="Afbeelding 15"/>
+          <p:cNvPr id="6" name="Afbeelding 5">
+            <a:extLst>
+              <a:ext uri="{FF2B5EF4-FFF2-40B4-BE49-F238E27FC236}">
+                <a16:creationId xmlns:a16="http://schemas.microsoft.com/office/drawing/2014/main" id="{7326501E-DAA9-48B9-B57C-51320B06906F}"/>
+              </a:ext>
+            </a:extLst>
+          </p:cNvPr>
           <p:cNvPicPr>
             <a:picLocks noChangeAspect="1"/>
           </p:cNvPicPr>
@@ -6818,8 +6554,8 @@
         </p:blipFill>
         <p:spPr>
           <a:xfrm>
-            <a:off x="3835686" y="1390952"/>
-            <a:ext cx="5435028" cy="5086048"/>
+            <a:off x="3386667" y="1513931"/>
+            <a:ext cx="5628113" cy="4622145"/>
           </a:xfrm>
           <a:prstGeom prst="rect">
             <a:avLst/>
@@ -6836,13 +6572,6 @@
   <p:clrMapOvr>
     <a:masterClrMapping/>
   </p:clrMapOvr>
-  <p:timing>
-    <p:tnLst>
-      <p:par>
-        <p:cTn xmlns:p14="http://schemas.microsoft.com/office/powerpoint/2010/main" id="1" dur="indefinite" restart="never" nodeType="tmRoot"/>
-      </p:par>
-    </p:tnLst>
-  </p:timing>
 </p:sld>
 </file>
 
@@ -6885,16 +6614,12 @@
           <a:p>
             <a:pPr algn="l"/>
             <a:r>
-              <a:rPr lang="en-US" dirty="0" smtClean="0">
+              <a:rPr lang="en-US" dirty="0">
                 <a:latin typeface="Comic Sans MS"/>
                 <a:cs typeface="Comic Sans MS"/>
               </a:rPr>
               <a:t>Bongo</a:t>
             </a:r>
-            <a:endParaRPr lang="en-US" dirty="0">
-              <a:latin typeface="Comic Sans MS"/>
-              <a:cs typeface="Comic Sans MS"/>
-            </a:endParaRPr>
           </a:p>
         </p:txBody>
       </p:sp>
@@ -6966,7 +6691,7 @@
           <a:lstStyle/>
           <a:p>
             <a:r>
-              <a:rPr lang="nl-NL" dirty="0" smtClean="0">
+              <a:rPr lang="nl-NL" dirty="0">
                 <a:latin typeface="Comic Sans MS"/>
                 <a:cs typeface="Comic Sans MS"/>
               </a:rPr>
@@ -6981,7 +6706,7 @@
           </a:p>
           <a:p>
             <a:r>
-              <a:rPr lang="nl-NL" dirty="0" smtClean="0">
+              <a:rPr lang="nl-NL" dirty="0">
                 <a:latin typeface="Comic Sans MS"/>
                 <a:cs typeface="Comic Sans MS"/>
               </a:rPr>
@@ -6996,7 +6721,7 @@
           </a:p>
           <a:p>
             <a:r>
-              <a:rPr lang="nl-NL" dirty="0" smtClean="0">
+              <a:rPr lang="nl-NL" dirty="0">
                 <a:latin typeface="Comic Sans MS"/>
                 <a:cs typeface="Comic Sans MS"/>
               </a:rPr>
@@ -7015,7 +6740,7 @@
               <a:buChar char="•"/>
             </a:pPr>
             <a:r>
-              <a:rPr lang="nl-NL" dirty="0" smtClean="0">
+              <a:rPr lang="nl-NL" dirty="0">
                 <a:latin typeface="Comic Sans MS"/>
                 <a:cs typeface="Comic Sans MS"/>
               </a:rPr>
@@ -7028,7 +6753,7 @@
               <a:buChar char="•"/>
             </a:pPr>
             <a:r>
-              <a:rPr lang="nl-NL" dirty="0" smtClean="0">
+              <a:rPr lang="nl-NL" dirty="0">
                 <a:latin typeface="Comic Sans MS"/>
                 <a:cs typeface="Comic Sans MS"/>
               </a:rPr>
@@ -7039,7 +6764,13 @@
       </p:sp>
       <p:pic>
         <p:nvPicPr>
-          <p:cNvPr id="7" name="Afbeelding 6"/>
+          <p:cNvPr id="9" name="Afbeelding 8">
+            <a:extLst>
+              <a:ext uri="{FF2B5EF4-FFF2-40B4-BE49-F238E27FC236}">
+                <a16:creationId xmlns:a16="http://schemas.microsoft.com/office/drawing/2014/main" id="{E8AB43B4-A7E8-4F65-ACCD-3E3D3715E478}"/>
+              </a:ext>
+            </a:extLst>
+          </p:cNvPr>
           <p:cNvPicPr>
             <a:picLocks noChangeAspect="1"/>
           </p:cNvPicPr>
@@ -7053,8 +6784,8 @@
         </p:blipFill>
         <p:spPr>
           <a:xfrm>
-            <a:off x="3835686" y="1175052"/>
-            <a:ext cx="5435028" cy="5086048"/>
+            <a:off x="4288831" y="1585814"/>
+            <a:ext cx="4725949" cy="3881234"/>
           </a:xfrm>
           <a:prstGeom prst="rect">
             <a:avLst/>
@@ -7071,13 +6802,6 @@
   <p:clrMapOvr>
     <a:masterClrMapping/>
   </p:clrMapOvr>
-  <p:timing>
-    <p:tnLst>
-      <p:par>
-        <p:cTn xmlns:p14="http://schemas.microsoft.com/office/powerpoint/2010/main" id="1" dur="indefinite" restart="never" nodeType="tmRoot"/>
-      </p:par>
-    </p:tnLst>
-  </p:timing>
 </p:sld>
 </file>
 
@@ -7120,16 +6844,12 @@
           <a:p>
             <a:pPr algn="l"/>
             <a:r>
-              <a:rPr lang="en-US" dirty="0" smtClean="0">
+              <a:rPr lang="en-US" dirty="0">
                 <a:latin typeface="Comic Sans MS"/>
                 <a:cs typeface="Comic Sans MS"/>
               </a:rPr>
               <a:t>Bongo</a:t>
             </a:r>
-            <a:endParaRPr lang="en-US" dirty="0">
-              <a:latin typeface="Comic Sans MS"/>
-              <a:cs typeface="Comic Sans MS"/>
-            </a:endParaRPr>
           </a:p>
         </p:txBody>
       </p:sp>
@@ -7201,7 +6921,7 @@
           <a:lstStyle/>
           <a:p>
             <a:r>
-              <a:rPr lang="nl-NL" dirty="0" smtClean="0">
+              <a:rPr lang="nl-NL" dirty="0">
                 <a:latin typeface="Comic Sans MS"/>
                 <a:cs typeface="Comic Sans MS"/>
               </a:rPr>
@@ -7216,35 +6936,35 @@
           </a:p>
           <a:p>
             <a:r>
-              <a:rPr lang="nl-NL" dirty="0" smtClean="0">
+              <a:rPr lang="nl-NL" dirty="0">
                 <a:latin typeface="Comic Sans MS"/>
                 <a:cs typeface="Comic Sans MS"/>
               </a:rPr>
               <a:t>Wanneer je met je handen boven de </a:t>
             </a:r>
             <a:r>
-              <a:rPr lang="nl-NL" dirty="0" err="1" smtClean="0">
+              <a:rPr lang="nl-NL" dirty="0" err="1">
                 <a:latin typeface="Comic Sans MS"/>
                 <a:cs typeface="Comic Sans MS"/>
               </a:rPr>
               <a:t>leap</a:t>
             </a:r>
             <a:r>
-              <a:rPr lang="nl-NL" dirty="0" smtClean="0">
+              <a:rPr lang="nl-NL" dirty="0">
                 <a:latin typeface="Comic Sans MS"/>
                 <a:cs typeface="Comic Sans MS"/>
               </a:rPr>
               <a:t> motion beweegt, zullen de groene en rode </a:t>
             </a:r>
             <a:r>
-              <a:rPr lang="nl-NL" dirty="0" err="1" smtClean="0">
+              <a:rPr lang="nl-NL" dirty="0" err="1">
                 <a:latin typeface="Comic Sans MS"/>
                 <a:cs typeface="Comic Sans MS"/>
               </a:rPr>
               <a:t>sprite</a:t>
             </a:r>
             <a:r>
-              <a:rPr lang="nl-NL" dirty="0" smtClean="0">
+              <a:rPr lang="nl-NL" dirty="0">
                 <a:latin typeface="Comic Sans MS"/>
                 <a:cs typeface="Comic Sans MS"/>
               </a:rPr>
@@ -7259,36 +6979,38 @@
           </a:p>
           <a:p>
             <a:r>
-              <a:rPr lang="nl-NL" dirty="0" smtClean="0">
+              <a:rPr lang="nl-NL" dirty="0">
                 <a:latin typeface="Comic Sans MS"/>
                 <a:cs typeface="Comic Sans MS"/>
               </a:rPr>
               <a:t>Als je je handen weghaalt verdwijnen de groene en rode </a:t>
             </a:r>
             <a:r>
-              <a:rPr lang="nl-NL" dirty="0" err="1" smtClean="0">
+              <a:rPr lang="nl-NL" dirty="0" err="1">
                 <a:latin typeface="Comic Sans MS"/>
                 <a:cs typeface="Comic Sans MS"/>
               </a:rPr>
               <a:t>sprite</a:t>
             </a:r>
             <a:r>
-              <a:rPr lang="nl-NL" dirty="0" smtClean="0">
+              <a:rPr lang="nl-NL" dirty="0">
                 <a:latin typeface="Comic Sans MS"/>
                 <a:cs typeface="Comic Sans MS"/>
               </a:rPr>
               <a:t> weer.</a:t>
             </a:r>
-            <a:endParaRPr lang="nl-NL" dirty="0">
-              <a:latin typeface="Comic Sans MS"/>
-              <a:cs typeface="Comic Sans MS"/>
-            </a:endParaRPr>
           </a:p>
         </p:txBody>
       </p:sp>
       <p:pic>
         <p:nvPicPr>
-          <p:cNvPr id="11" name="Afbeelding 10"/>
+          <p:cNvPr id="9" name="Afbeelding 8">
+            <a:extLst>
+              <a:ext uri="{FF2B5EF4-FFF2-40B4-BE49-F238E27FC236}">
+                <a16:creationId xmlns:a16="http://schemas.microsoft.com/office/drawing/2014/main" id="{1FF098E6-057E-49C5-BEAB-9EF5203FAC2B}"/>
+              </a:ext>
+            </a:extLst>
+          </p:cNvPr>
           <p:cNvPicPr>
             <a:picLocks noChangeAspect="1"/>
           </p:cNvPicPr>
@@ -7302,8 +7024,8 @@
         </p:blipFill>
         <p:spPr>
           <a:xfrm>
-            <a:off x="3523435" y="1390952"/>
-            <a:ext cx="5798104" cy="3828748"/>
+            <a:off x="3816883" y="1574484"/>
+            <a:ext cx="5187499" cy="4260287"/>
           </a:xfrm>
           <a:prstGeom prst="rect">
             <a:avLst/>
@@ -7318,7 +7040,7 @@
         </p:nvSpPr>
         <p:spPr>
           <a:xfrm>
-            <a:off x="5735562" y="1707394"/>
+            <a:off x="5552682" y="1585328"/>
             <a:ext cx="568476" cy="391822"/>
           </a:xfrm>
           <a:prstGeom prst="roundRect">
@@ -7364,13 +7086,6 @@
   <p:clrMapOvr>
     <a:masterClrMapping/>
   </p:clrMapOvr>
-  <p:timing>
-    <p:tnLst>
-      <p:par>
-        <p:cTn xmlns:p14="http://schemas.microsoft.com/office/powerpoint/2010/main" id="1" dur="indefinite" restart="never" nodeType="tmRoot"/>
-      </p:par>
-    </p:tnLst>
-  </p:timing>
 </p:sld>
 </file>
 
@@ -7413,16 +7128,12 @@
           <a:p>
             <a:pPr algn="l"/>
             <a:r>
-              <a:rPr lang="en-US" dirty="0" smtClean="0">
+              <a:rPr lang="en-US" dirty="0">
                 <a:latin typeface="Comic Sans MS"/>
                 <a:cs typeface="Comic Sans MS"/>
               </a:rPr>
               <a:t>Bongo</a:t>
             </a:r>
-            <a:endParaRPr lang="en-US" dirty="0">
-              <a:latin typeface="Comic Sans MS"/>
-              <a:cs typeface="Comic Sans MS"/>
-            </a:endParaRPr>
           </a:p>
         </p:txBody>
       </p:sp>
@@ -7494,7 +7205,7 @@
           <a:lstStyle/>
           <a:p>
             <a:r>
-              <a:rPr lang="nl-NL" dirty="0" smtClean="0">
+              <a:rPr lang="nl-NL" dirty="0">
                 <a:latin typeface="Comic Sans MS"/>
                 <a:cs typeface="Comic Sans MS"/>
               </a:rPr>
@@ -7509,26 +7220,37 @@
           </a:p>
           <a:p>
             <a:r>
-              <a:rPr lang="nl-NL" dirty="0" smtClean="0">
+              <a:rPr lang="nl-NL" dirty="0">
                 <a:latin typeface="Comic Sans MS"/>
                 <a:cs typeface="Comic Sans MS"/>
               </a:rPr>
               <a:t>Klik op de drum1 in het </a:t>
             </a:r>
             <a:r>
-              <a:rPr lang="nl-NL" dirty="0" err="1" smtClean="0">
+              <a:rPr lang="nl-NL" dirty="0" err="1">
                 <a:latin typeface="Comic Sans MS"/>
                 <a:cs typeface="Comic Sans MS"/>
               </a:rPr>
               <a:t>sprite</a:t>
             </a:r>
             <a:r>
-              <a:rPr lang="nl-NL" dirty="0" smtClean="0">
+              <a:rPr lang="nl-NL" dirty="0">
                 <a:latin typeface="Comic Sans MS"/>
                 <a:cs typeface="Comic Sans MS"/>
               </a:rPr>
               <a:t> scherm.</a:t>
             </a:r>
+          </a:p>
+          <a:p>
+            <a:r>
+              <a:rPr lang="nl-NL" dirty="0">
+                <a:latin typeface="Comic Sans MS"/>
+                <a:cs typeface="Comic Sans MS"/>
+              </a:rPr>
+              <a:t>Op het programma scherm zie je nu de bouwstenen van het programma van de drum.</a:t>
+            </a:r>
+          </a:p>
+          <a:p>
             <a:endParaRPr lang="nl-NL" dirty="0">
               <a:latin typeface="Comic Sans MS"/>
               <a:cs typeface="Comic Sans MS"/>
@@ -7536,22 +7258,7 @@
           </a:p>
           <a:p>
             <a:r>
-              <a:rPr lang="nl-NL" dirty="0" smtClean="0">
-                <a:latin typeface="Comic Sans MS"/>
-                <a:cs typeface="Comic Sans MS"/>
-              </a:rPr>
-              <a:t>Op het programma scherm zie je nu de bouwstenen van het programma van de drum.</a:t>
-            </a:r>
-          </a:p>
-          <a:p>
-            <a:endParaRPr lang="nl-NL" dirty="0" smtClean="0">
-              <a:latin typeface="Comic Sans MS"/>
-              <a:cs typeface="Comic Sans MS"/>
-            </a:endParaRPr>
-          </a:p>
-          <a:p>
-            <a:r>
-              <a:rPr lang="nl-NL" dirty="0" smtClean="0">
+              <a:rPr lang="nl-NL" dirty="0">
                 <a:latin typeface="Comic Sans MS"/>
                 <a:cs typeface="Comic Sans MS"/>
               </a:rPr>
@@ -7594,13 +7301,6 @@
   <p:clrMapOvr>
     <a:masterClrMapping/>
   </p:clrMapOvr>
-  <p:timing>
-    <p:tnLst>
-      <p:par>
-        <p:cTn xmlns:p14="http://schemas.microsoft.com/office/powerpoint/2010/main" id="1" dur="indefinite" restart="never" nodeType="tmRoot"/>
-      </p:par>
-    </p:tnLst>
-  </p:timing>
 </p:sld>
 </file>
 
@@ -7643,16 +7343,12 @@
           <a:p>
             <a:pPr algn="l"/>
             <a:r>
-              <a:rPr lang="en-US" dirty="0" smtClean="0">
+              <a:rPr lang="en-US" dirty="0">
                 <a:latin typeface="Comic Sans MS"/>
                 <a:cs typeface="Comic Sans MS"/>
               </a:rPr>
               <a:t>Bongo</a:t>
             </a:r>
-            <a:endParaRPr lang="en-US" dirty="0">
-              <a:latin typeface="Comic Sans MS"/>
-              <a:cs typeface="Comic Sans MS"/>
-            </a:endParaRPr>
           </a:p>
         </p:txBody>
       </p:sp>
@@ -7724,118 +7420,11 @@
           <a:lstStyle/>
           <a:p>
             <a:r>
-              <a:rPr lang="nl-NL" dirty="0" smtClean="0">
+              <a:rPr lang="nl-NL" dirty="0">
                 <a:latin typeface="Comic Sans MS"/>
                 <a:cs typeface="Comic Sans MS"/>
               </a:rPr>
               <a:t>Eerst voegen we een herhaal-blok toe zodat het programma blijft herhalen.</a:t>
-            </a:r>
-          </a:p>
-          <a:p>
-            <a:endParaRPr lang="nl-NL" dirty="0" smtClean="0">
-              <a:latin typeface="Comic Sans MS"/>
-              <a:cs typeface="Comic Sans MS"/>
-            </a:endParaRPr>
-          </a:p>
-          <a:p>
-            <a:r>
-              <a:rPr lang="nl-NL" dirty="0" smtClean="0">
-                <a:latin typeface="Comic Sans MS"/>
-                <a:cs typeface="Comic Sans MS"/>
-              </a:rPr>
-              <a:t>Klik </a:t>
-            </a:r>
-            <a:r>
-              <a:rPr lang="nl-NL" dirty="0">
-                <a:latin typeface="Comic Sans MS"/>
-                <a:cs typeface="Comic Sans MS"/>
-              </a:rPr>
-              <a:t>op </a:t>
-            </a:r>
-            <a:r>
-              <a:rPr lang="nl-NL" dirty="0" smtClean="0">
-                <a:latin typeface="Comic Sans MS"/>
-                <a:cs typeface="Comic Sans MS"/>
-              </a:rPr>
-              <a:t>‘</a:t>
-            </a:r>
-            <a:r>
-              <a:rPr lang="nl-NL" dirty="0" smtClean="0">
-                <a:solidFill>
-                  <a:srgbClr val="DA9B00"/>
-                </a:solidFill>
-                <a:latin typeface="Comic Sans MS"/>
-                <a:cs typeface="Comic Sans MS"/>
-              </a:rPr>
-              <a:t>Besturen</a:t>
-            </a:r>
-            <a:r>
-              <a:rPr lang="nl-NL" dirty="0" smtClean="0">
-                <a:latin typeface="Comic Sans MS"/>
-                <a:cs typeface="Comic Sans MS"/>
-              </a:rPr>
-              <a:t>’ </a:t>
-            </a:r>
-            <a:r>
-              <a:rPr lang="nl-NL" dirty="0">
-                <a:latin typeface="Comic Sans MS"/>
-                <a:cs typeface="Comic Sans MS"/>
-              </a:rPr>
-              <a:t>bouwstenen.</a:t>
-            </a:r>
-          </a:p>
-          <a:p>
-            <a:r>
-              <a:rPr lang="nl-NL" dirty="0" smtClean="0">
-                <a:latin typeface="Comic Sans MS"/>
-                <a:cs typeface="Comic Sans MS"/>
-              </a:rPr>
-              <a:t>Sleep </a:t>
-            </a:r>
-            <a:r>
-              <a:rPr lang="nl-NL" dirty="0">
-                <a:latin typeface="Comic Sans MS"/>
-                <a:cs typeface="Comic Sans MS"/>
-              </a:rPr>
-              <a:t>dan de bouwsteen </a:t>
-            </a:r>
-            <a:r>
-              <a:rPr lang="nl-NL" dirty="0" smtClean="0">
-                <a:latin typeface="Comic Sans MS"/>
-                <a:cs typeface="Comic Sans MS"/>
-              </a:rPr>
-              <a:t>‘</a:t>
-            </a:r>
-            <a:r>
-              <a:rPr lang="nl-NL" dirty="0" smtClean="0">
-                <a:solidFill>
-                  <a:srgbClr val="DA9B00"/>
-                </a:solidFill>
-                <a:latin typeface="Comic Sans MS"/>
-                <a:cs typeface="Comic Sans MS"/>
-              </a:rPr>
-              <a:t>herhaal</a:t>
-            </a:r>
-            <a:r>
-              <a:rPr lang="nl-NL" dirty="0" smtClean="0">
-                <a:latin typeface="Comic Sans MS"/>
-                <a:cs typeface="Comic Sans MS"/>
-              </a:rPr>
-              <a:t>’ </a:t>
-            </a:r>
-            <a:r>
-              <a:rPr lang="nl-NL" dirty="0">
-                <a:latin typeface="Comic Sans MS"/>
-                <a:cs typeface="Comic Sans MS"/>
-              </a:rPr>
-              <a:t>naar het programma veld en plaats hem </a:t>
-            </a:r>
-            <a:r>
-              <a:rPr lang="nl-NL" dirty="0" smtClean="0">
-                <a:latin typeface="Comic Sans MS"/>
-                <a:cs typeface="Comic Sans MS"/>
-              </a:rPr>
-              <a:t>onder de startsteen. </a:t>
             </a:r>
           </a:p>
           <a:p>
@@ -7846,25 +7435,54 @@
           </a:p>
           <a:p>
             <a:r>
-              <a:rPr lang="nl-NL" dirty="0" smtClean="0">
-                <a:latin typeface="Comic Sans MS"/>
-                <a:cs typeface="Comic Sans MS"/>
-              </a:rPr>
-              <a:t>Vervolgens gaan we de controle of de drum door een hand geraakt wordt maken, we beginnen met het toevoegen van een </a:t>
-            </a:r>
-            <a:r>
-              <a:rPr lang="nl-NL" dirty="0" err="1" smtClean="0">
-                <a:latin typeface="Comic Sans MS"/>
-                <a:cs typeface="Comic Sans MS"/>
-              </a:rPr>
-              <a:t>als-dan</a:t>
-            </a:r>
-            <a:r>
-              <a:rPr lang="nl-NL" dirty="0" smtClean="0">
-                <a:latin typeface="Comic Sans MS"/>
-                <a:cs typeface="Comic Sans MS"/>
-              </a:rPr>
-              <a:t> blok</a:t>
+              <a:rPr lang="nl-NL" dirty="0">
+                <a:latin typeface="Comic Sans MS"/>
+                <a:cs typeface="Comic Sans MS"/>
+              </a:rPr>
+              <a:t>Klik op ‘</a:t>
+            </a:r>
+            <a:r>
+              <a:rPr lang="nl-NL" dirty="0">
+                <a:solidFill>
+                  <a:srgbClr val="DA9B00"/>
+                </a:solidFill>
+                <a:latin typeface="Comic Sans MS"/>
+                <a:cs typeface="Comic Sans MS"/>
+              </a:rPr>
+              <a:t>Besturen</a:t>
+            </a:r>
+            <a:r>
+              <a:rPr lang="nl-NL" dirty="0">
+                <a:latin typeface="Comic Sans MS"/>
+                <a:cs typeface="Comic Sans MS"/>
+              </a:rPr>
+              <a:t>’ bouwstenen.</a:t>
+            </a:r>
+          </a:p>
+          <a:p>
+            <a:r>
+              <a:rPr lang="nl-NL" dirty="0">
+                <a:latin typeface="Comic Sans MS"/>
+                <a:cs typeface="Comic Sans MS"/>
+              </a:rPr>
+              <a:t>Sleep dan de bouwsteen ‘</a:t>
+            </a:r>
+            <a:r>
+              <a:rPr lang="nl-NL" dirty="0">
+                <a:solidFill>
+                  <a:srgbClr val="DA9B00"/>
+                </a:solidFill>
+                <a:latin typeface="Comic Sans MS"/>
+                <a:cs typeface="Comic Sans MS"/>
+              </a:rPr>
+              <a:t>herhaal</a:t>
+            </a:r>
+            <a:r>
+              <a:rPr lang="nl-NL" dirty="0">
+                <a:latin typeface="Comic Sans MS"/>
+                <a:cs typeface="Comic Sans MS"/>
+              </a:rPr>
+              <a:t>’ naar het programma veld en plaats hem onder de startsteen. </a:t>
             </a:r>
           </a:p>
           <a:p>
@@ -7879,31 +7497,39 @@
                 <a:latin typeface="Comic Sans MS"/>
                 <a:cs typeface="Comic Sans MS"/>
               </a:rPr>
-              <a:t>Sleep </a:t>
-            </a:r>
-            <a:r>
-              <a:rPr lang="nl-NL" dirty="0" smtClean="0">
-                <a:latin typeface="Comic Sans MS"/>
-                <a:cs typeface="Comic Sans MS"/>
-              </a:rPr>
-              <a:t>de </a:t>
-            </a:r>
-            <a:r>
-              <a:rPr lang="nl-NL" dirty="0">
-                <a:latin typeface="Comic Sans MS"/>
-                <a:cs typeface="Comic Sans MS"/>
-              </a:rPr>
-              <a:t>bouwsteen </a:t>
-            </a:r>
-            <a:r>
-              <a:rPr lang="nl-NL" dirty="0" smtClean="0">
-                <a:latin typeface="Comic Sans MS"/>
-                <a:cs typeface="Comic Sans MS"/>
-              </a:rPr>
-              <a:t>‘</a:t>
-            </a:r>
-            <a:r>
-              <a:rPr lang="nl-NL" dirty="0" smtClean="0">
+              <a:t>Vervolgens gaan we de controle of de drum door een hand geraakt wordt maken, we beginnen met het toevoegen van een </a:t>
+            </a:r>
+            <a:r>
+              <a:rPr lang="nl-NL" dirty="0" err="1">
+                <a:latin typeface="Comic Sans MS"/>
+                <a:cs typeface="Comic Sans MS"/>
+              </a:rPr>
+              <a:t>als-dan</a:t>
+            </a:r>
+            <a:r>
+              <a:rPr lang="nl-NL" dirty="0">
+                <a:latin typeface="Comic Sans MS"/>
+                <a:cs typeface="Comic Sans MS"/>
+              </a:rPr>
+              <a:t> blok</a:t>
+            </a:r>
+          </a:p>
+          <a:p>
+            <a:endParaRPr lang="nl-NL" dirty="0">
+              <a:latin typeface="Comic Sans MS"/>
+              <a:cs typeface="Comic Sans MS"/>
+            </a:endParaRPr>
+          </a:p>
+          <a:p>
+            <a:r>
+              <a:rPr lang="nl-NL" dirty="0">
+                <a:latin typeface="Comic Sans MS"/>
+                <a:cs typeface="Comic Sans MS"/>
+              </a:rPr>
+              <a:t>Sleep de bouwsteen ‘</a:t>
+            </a:r>
+            <a:r>
+              <a:rPr lang="nl-NL" dirty="0">
                 <a:solidFill>
                   <a:srgbClr val="DA9B00"/>
                 </a:solidFill>
@@ -7913,32 +7539,11 @@
               <a:t>als - dan</a:t>
             </a:r>
             <a:r>
-              <a:rPr lang="nl-NL" dirty="0" smtClean="0">
-                <a:latin typeface="Comic Sans MS"/>
-                <a:cs typeface="Comic Sans MS"/>
-              </a:rPr>
-              <a:t>’ </a:t>
-            </a:r>
-            <a:r>
-              <a:rPr lang="nl-NL" dirty="0">
-                <a:latin typeface="Comic Sans MS"/>
-                <a:cs typeface="Comic Sans MS"/>
-              </a:rPr>
-              <a:t>naar het programma veld en plaats hem </a:t>
-            </a:r>
-            <a:r>
-              <a:rPr lang="nl-NL" dirty="0" smtClean="0">
-                <a:latin typeface="Comic Sans MS"/>
-                <a:cs typeface="Comic Sans MS"/>
-              </a:rPr>
-              <a:t>binnen de herhaal-steen</a:t>
-            </a:r>
-            <a:r>
-              <a:rPr lang="nl-NL" dirty="0">
-                <a:latin typeface="Comic Sans MS"/>
-                <a:cs typeface="Comic Sans MS"/>
-              </a:rPr>
-              <a:t>. </a:t>
+              <a:rPr lang="nl-NL" dirty="0">
+                <a:latin typeface="Comic Sans MS"/>
+                <a:cs typeface="Comic Sans MS"/>
+              </a:rPr>
+              <a:t>’ naar het programma veld en plaats hem binnen de herhaal-steen. </a:t>
             </a:r>
           </a:p>
           <a:p>
@@ -8101,13 +7706,6 @@
   <p:clrMapOvr>
     <a:masterClrMapping/>
   </p:clrMapOvr>
-  <p:timing>
-    <p:tnLst>
-      <p:par>
-        <p:cTn xmlns:p14="http://schemas.microsoft.com/office/powerpoint/2010/main" id="1" dur="indefinite" restart="never" nodeType="tmRoot"/>
-      </p:par>
-    </p:tnLst>
-  </p:timing>
 </p:sld>
 </file>
 
@@ -8150,16 +7748,12 @@
           <a:p>
             <a:pPr algn="l"/>
             <a:r>
-              <a:rPr lang="en-US" dirty="0" smtClean="0">
+              <a:rPr lang="en-US" dirty="0">
                 <a:latin typeface="Comic Sans MS"/>
                 <a:cs typeface="Comic Sans MS"/>
               </a:rPr>
               <a:t>Bongo</a:t>
             </a:r>
-            <a:endParaRPr lang="en-US" dirty="0">
-              <a:latin typeface="Comic Sans MS"/>
-              <a:cs typeface="Comic Sans MS"/>
-            </a:endParaRPr>
           </a:p>
         </p:txBody>
       </p:sp>
@@ -8231,7 +7825,7 @@
           <a:lstStyle/>
           <a:p>
             <a:r>
-              <a:rPr lang="nl-NL" dirty="0" smtClean="0">
+              <a:rPr lang="nl-NL" dirty="0">
                 <a:latin typeface="Comic Sans MS"/>
                 <a:cs typeface="Comic Sans MS"/>
               </a:rPr>
@@ -8240,146 +7834,39 @@
           </a:p>
           <a:p>
             <a:r>
-              <a:rPr lang="nl-NL" dirty="0" smtClean="0">
+              <a:rPr lang="nl-NL" dirty="0">
                 <a:latin typeface="Comic Sans MS"/>
                 <a:cs typeface="Comic Sans MS"/>
               </a:rPr>
               <a:t>We willen dat de conditie waar is als de </a:t>
             </a:r>
             <a:r>
-              <a:rPr lang="nl-NL" dirty="0" err="1" smtClean="0">
+              <a:rPr lang="nl-NL" dirty="0" err="1">
                 <a:latin typeface="Comic Sans MS"/>
                 <a:cs typeface="Comic Sans MS"/>
               </a:rPr>
               <a:t>sprite</a:t>
             </a:r>
             <a:r>
-              <a:rPr lang="nl-NL" dirty="0" smtClean="0">
+              <a:rPr lang="nl-NL" dirty="0">
                 <a:latin typeface="Comic Sans MS"/>
                 <a:cs typeface="Comic Sans MS"/>
               </a:rPr>
               <a:t> hand1 </a:t>
             </a:r>
             <a:r>
-              <a:rPr lang="nl-NL" b="1" dirty="0" smtClean="0">
+              <a:rPr lang="nl-NL" b="1" dirty="0">
                 <a:latin typeface="Comic Sans MS"/>
                 <a:cs typeface="Comic Sans MS"/>
               </a:rPr>
               <a:t>of</a:t>
             </a:r>
             <a:r>
-              <a:rPr lang="nl-NL" dirty="0" smtClean="0">
+              <a:rPr lang="nl-NL" dirty="0">
                 <a:latin typeface="Comic Sans MS"/>
                 <a:cs typeface="Comic Sans MS"/>
               </a:rPr>
               <a:t> hand2 de drum raken, we beginnen met een of-steen</a:t>
-            </a:r>
-          </a:p>
-          <a:p>
-            <a:endParaRPr lang="nl-NL" dirty="0" smtClean="0">
-              <a:latin typeface="Comic Sans MS"/>
-              <a:cs typeface="Comic Sans MS"/>
-            </a:endParaRPr>
-          </a:p>
-          <a:p>
-            <a:r>
-              <a:rPr lang="nl-NL" dirty="0" smtClean="0">
-                <a:latin typeface="Comic Sans MS"/>
-                <a:cs typeface="Comic Sans MS"/>
-              </a:rPr>
-              <a:t>Klik </a:t>
-            </a:r>
-            <a:r>
-              <a:rPr lang="nl-NL" dirty="0">
-                <a:latin typeface="Comic Sans MS"/>
-                <a:cs typeface="Comic Sans MS"/>
-              </a:rPr>
-              <a:t>op </a:t>
-            </a:r>
-            <a:r>
-              <a:rPr lang="nl-NL" dirty="0" smtClean="0">
-                <a:latin typeface="Comic Sans MS"/>
-                <a:cs typeface="Comic Sans MS"/>
-              </a:rPr>
-              <a:t>‘</a:t>
-            </a:r>
-            <a:r>
-              <a:rPr lang="nl-NL" dirty="0" smtClean="0">
-                <a:solidFill>
-                  <a:srgbClr val="4BAF00"/>
-                </a:solidFill>
-                <a:latin typeface="Comic Sans MS"/>
-                <a:cs typeface="Comic Sans MS"/>
-              </a:rPr>
-              <a:t>Functies</a:t>
-            </a:r>
-            <a:r>
-              <a:rPr lang="nl-NL" dirty="0" smtClean="0">
-                <a:latin typeface="Comic Sans MS"/>
-                <a:cs typeface="Comic Sans MS"/>
-              </a:rPr>
-              <a:t>’ </a:t>
-            </a:r>
-            <a:r>
-              <a:rPr lang="nl-NL" dirty="0">
-                <a:latin typeface="Comic Sans MS"/>
-                <a:cs typeface="Comic Sans MS"/>
-              </a:rPr>
-              <a:t>bouwstenen.</a:t>
-            </a:r>
-          </a:p>
-          <a:p>
-            <a:r>
-              <a:rPr lang="nl-NL" dirty="0" smtClean="0">
-                <a:latin typeface="Comic Sans MS"/>
-                <a:cs typeface="Comic Sans MS"/>
-              </a:rPr>
-              <a:t>Sleep </a:t>
-            </a:r>
-            <a:r>
-              <a:rPr lang="nl-NL" dirty="0">
-                <a:latin typeface="Comic Sans MS"/>
-                <a:cs typeface="Comic Sans MS"/>
-              </a:rPr>
-              <a:t>dan de bouwsteen </a:t>
-            </a:r>
-            <a:r>
-              <a:rPr lang="nl-NL" dirty="0" smtClean="0">
-                <a:latin typeface="Comic Sans MS"/>
-                <a:cs typeface="Comic Sans MS"/>
-              </a:rPr>
-              <a:t>‘</a:t>
-            </a:r>
-            <a:r>
-              <a:rPr lang="nl-NL" dirty="0" smtClean="0">
-                <a:solidFill>
-                  <a:srgbClr val="4BAF00"/>
-                </a:solidFill>
-                <a:latin typeface="Comic Sans MS"/>
-                <a:cs typeface="Comic Sans MS"/>
-              </a:rPr>
-              <a:t>of</a:t>
-            </a:r>
-            <a:r>
-              <a:rPr lang="nl-NL" dirty="0" smtClean="0">
-                <a:latin typeface="Comic Sans MS"/>
-                <a:cs typeface="Comic Sans MS"/>
-              </a:rPr>
-              <a:t>’ </a:t>
-            </a:r>
-            <a:r>
-              <a:rPr lang="nl-NL" dirty="0">
-                <a:latin typeface="Comic Sans MS"/>
-                <a:cs typeface="Comic Sans MS"/>
-              </a:rPr>
-              <a:t>naar het programma veld en plaats hem </a:t>
-            </a:r>
-            <a:r>
-              <a:rPr lang="nl-NL" dirty="0" smtClean="0">
-                <a:latin typeface="Comic Sans MS"/>
-                <a:cs typeface="Comic Sans MS"/>
-              </a:rPr>
-              <a:t>in het veld tussen als en dan.</a:t>
             </a:r>
           </a:p>
           <a:p>
@@ -8394,141 +7881,146 @@
                 <a:latin typeface="Comic Sans MS"/>
                 <a:cs typeface="Comic Sans MS"/>
               </a:rPr>
-              <a:t>Klik op </a:t>
-            </a:r>
-            <a:r>
-              <a:rPr lang="nl-NL" dirty="0" smtClean="0">
-                <a:latin typeface="Comic Sans MS"/>
-                <a:cs typeface="Comic Sans MS"/>
-              </a:rPr>
-              <a:t>‘</a:t>
-            </a:r>
-            <a:r>
-              <a:rPr lang="nl-NL" dirty="0" smtClean="0">
+              <a:t>Klik op ‘</a:t>
+            </a:r>
+            <a:r>
+              <a:rPr lang="nl-NL" dirty="0">
                 <a:solidFill>
-                  <a:srgbClr val="1F90DB"/>
+                  <a:srgbClr val="4BAF00"/>
                 </a:solidFill>
                 <a:latin typeface="Comic Sans MS"/>
                 <a:cs typeface="Comic Sans MS"/>
               </a:rPr>
-              <a:t>Waarnemen</a:t>
-            </a:r>
-            <a:r>
-              <a:rPr lang="nl-NL" dirty="0" smtClean="0">
-                <a:latin typeface="Comic Sans MS"/>
-                <a:cs typeface="Comic Sans MS"/>
-              </a:rPr>
-              <a:t>’ </a:t>
-            </a:r>
-            <a:r>
-              <a:rPr lang="nl-NL" dirty="0">
-                <a:latin typeface="Comic Sans MS"/>
-                <a:cs typeface="Comic Sans MS"/>
-              </a:rPr>
-              <a:t>bouwstenen.</a:t>
-            </a:r>
-          </a:p>
-          <a:p>
-            <a:r>
-              <a:rPr lang="nl-NL" dirty="0">
-                <a:latin typeface="Comic Sans MS"/>
-                <a:cs typeface="Comic Sans MS"/>
-              </a:rPr>
-              <a:t>Sleep </a:t>
-            </a:r>
-            <a:r>
-              <a:rPr lang="nl-NL" dirty="0" smtClean="0">
-                <a:latin typeface="Comic Sans MS"/>
-                <a:cs typeface="Comic Sans MS"/>
-              </a:rPr>
-              <a:t>twee keer de </a:t>
-            </a:r>
-            <a:r>
-              <a:rPr lang="nl-NL" dirty="0">
-                <a:latin typeface="Comic Sans MS"/>
-                <a:cs typeface="Comic Sans MS"/>
-              </a:rPr>
-              <a:t>bouwsteen </a:t>
-            </a:r>
-            <a:r>
-              <a:rPr lang="nl-NL" dirty="0" smtClean="0">
-                <a:latin typeface="Comic Sans MS"/>
-                <a:cs typeface="Comic Sans MS"/>
-              </a:rPr>
-              <a:t>‘</a:t>
-            </a:r>
-            <a:r>
-              <a:rPr lang="nl-NL" dirty="0" smtClean="0">
+              <a:t>Functies</a:t>
+            </a:r>
+            <a:r>
+              <a:rPr lang="nl-NL" dirty="0">
+                <a:latin typeface="Comic Sans MS"/>
+                <a:cs typeface="Comic Sans MS"/>
+              </a:rPr>
+              <a:t>’ bouwstenen.</a:t>
+            </a:r>
+          </a:p>
+          <a:p>
+            <a:r>
+              <a:rPr lang="nl-NL" dirty="0">
+                <a:latin typeface="Comic Sans MS"/>
+                <a:cs typeface="Comic Sans MS"/>
+              </a:rPr>
+              <a:t>Sleep dan de bouwsteen ‘</a:t>
+            </a:r>
+            <a:r>
+              <a:rPr lang="nl-NL" dirty="0">
                 <a:solidFill>
-                  <a:srgbClr val="1F90DB"/>
+                  <a:srgbClr val="4BAF00"/>
                 </a:solidFill>
                 <a:latin typeface="Comic Sans MS"/>
                 <a:cs typeface="Comic Sans MS"/>
               </a:rPr>
-              <a:t>raak ik ?</a:t>
-            </a:r>
-            <a:r>
-              <a:rPr lang="nl-NL" dirty="0" smtClean="0">
-                <a:latin typeface="Comic Sans MS"/>
-                <a:cs typeface="Comic Sans MS"/>
-              </a:rPr>
-              <a:t>’ </a:t>
-            </a:r>
-            <a:r>
-              <a:rPr lang="nl-NL" dirty="0">
-                <a:latin typeface="Comic Sans MS"/>
-                <a:cs typeface="Comic Sans MS"/>
-              </a:rPr>
-              <a:t>naar het programma veld en plaats </a:t>
-            </a:r>
-            <a:r>
-              <a:rPr lang="nl-NL" dirty="0" smtClean="0">
-                <a:latin typeface="Comic Sans MS"/>
-                <a:cs typeface="Comic Sans MS"/>
-              </a:rPr>
-              <a:t>ze in de velden links en rechts van de of. Klik op het pijltje en kies in het eerste blok ‘</a:t>
-            </a:r>
-            <a:r>
-              <a:rPr lang="nl-NL" dirty="0" smtClean="0">
-                <a:solidFill>
-                  <a:srgbClr val="1F90DB"/>
-                </a:solidFill>
-                <a:latin typeface="Comic Sans MS"/>
-                <a:cs typeface="Comic Sans MS"/>
-              </a:rPr>
-              <a:t>Hand 1</a:t>
-            </a:r>
-            <a:r>
-              <a:rPr lang="nl-NL" dirty="0" smtClean="0">
-                <a:latin typeface="Comic Sans MS"/>
-                <a:cs typeface="Comic Sans MS"/>
-              </a:rPr>
-              <a:t>’ en in het tweede blok ‘</a:t>
-            </a:r>
-            <a:r>
-              <a:rPr lang="nl-NL" dirty="0" smtClean="0">
-                <a:solidFill>
-                  <a:srgbClr val="1F90DB"/>
-                </a:solidFill>
-                <a:latin typeface="Comic Sans MS"/>
-                <a:cs typeface="Comic Sans MS"/>
-              </a:rPr>
-              <a:t>Hand 2</a:t>
-            </a:r>
-            <a:r>
-              <a:rPr lang="nl-NL" dirty="0" smtClean="0">
-                <a:latin typeface="Comic Sans MS"/>
-                <a:cs typeface="Comic Sans MS"/>
-              </a:rPr>
-              <a:t>’</a:t>
-            </a:r>
+              <a:t>of</a:t>
+            </a:r>
+            <a:r>
+              <a:rPr lang="nl-NL" dirty="0">
+                <a:latin typeface="Comic Sans MS"/>
+                <a:cs typeface="Comic Sans MS"/>
+              </a:rPr>
+              <a:t>’ naar het programma veld en plaats hem in het veld tussen als en dan.</a:t>
+            </a:r>
+          </a:p>
+          <a:p>
             <a:endParaRPr lang="nl-NL" dirty="0">
               <a:latin typeface="Comic Sans MS"/>
               <a:cs typeface="Comic Sans MS"/>
             </a:endParaRPr>
           </a:p>
           <a:p>
-            <a:endParaRPr lang="nl-NL" dirty="0" smtClean="0">
+            <a:r>
+              <a:rPr lang="nl-NL" dirty="0">
+                <a:latin typeface="Comic Sans MS"/>
+                <a:cs typeface="Comic Sans MS"/>
+              </a:rPr>
+              <a:t>Klik op ‘</a:t>
+            </a:r>
+            <a:r>
+              <a:rPr lang="nl-NL" dirty="0">
+                <a:solidFill>
+                  <a:srgbClr val="1F90DB"/>
+                </a:solidFill>
+                <a:latin typeface="Comic Sans MS"/>
+                <a:cs typeface="Comic Sans MS"/>
+              </a:rPr>
+              <a:t>Waarnemen</a:t>
+            </a:r>
+            <a:r>
+              <a:rPr lang="nl-NL" dirty="0">
+                <a:latin typeface="Comic Sans MS"/>
+                <a:cs typeface="Comic Sans MS"/>
+              </a:rPr>
+              <a:t>’ bouwstenen.</a:t>
+            </a:r>
+          </a:p>
+          <a:p>
+            <a:r>
+              <a:rPr lang="nl-NL" dirty="0">
+                <a:latin typeface="Comic Sans MS"/>
+                <a:cs typeface="Comic Sans MS"/>
+              </a:rPr>
+              <a:t>Sleep twee keer de bouwsteen ‘</a:t>
+            </a:r>
+            <a:r>
+              <a:rPr lang="nl-NL" dirty="0">
+                <a:solidFill>
+                  <a:srgbClr val="1F90DB"/>
+                </a:solidFill>
+                <a:latin typeface="Comic Sans MS"/>
+                <a:cs typeface="Comic Sans MS"/>
+              </a:rPr>
+              <a:t>raak ik ?</a:t>
+            </a:r>
+            <a:r>
+              <a:rPr lang="nl-NL" dirty="0">
+                <a:latin typeface="Comic Sans MS"/>
+                <a:cs typeface="Comic Sans MS"/>
+              </a:rPr>
+              <a:t>’ naar het programma veld en plaats ze in de velden links en rechts van de of. Klik op het pijltje en kies in het eerste blok ‘</a:t>
+            </a:r>
+            <a:r>
+              <a:rPr lang="nl-NL" dirty="0">
+                <a:solidFill>
+                  <a:srgbClr val="1F90DB"/>
+                </a:solidFill>
+                <a:latin typeface="Comic Sans MS"/>
+                <a:cs typeface="Comic Sans MS"/>
+              </a:rPr>
+              <a:t>Hand 1</a:t>
+            </a:r>
+            <a:r>
+              <a:rPr lang="nl-NL" dirty="0">
+                <a:latin typeface="Comic Sans MS"/>
+                <a:cs typeface="Comic Sans MS"/>
+              </a:rPr>
+              <a:t>’ en in het tweede blok ‘</a:t>
+            </a:r>
+            <a:r>
+              <a:rPr lang="nl-NL" dirty="0">
+                <a:solidFill>
+                  <a:srgbClr val="1F90DB"/>
+                </a:solidFill>
+                <a:latin typeface="Comic Sans MS"/>
+                <a:cs typeface="Comic Sans MS"/>
+              </a:rPr>
+              <a:t>Hand 2</a:t>
+            </a:r>
+            <a:r>
+              <a:rPr lang="nl-NL" dirty="0">
+                <a:latin typeface="Comic Sans MS"/>
+                <a:cs typeface="Comic Sans MS"/>
+              </a:rPr>
+              <a:t>’</a:t>
+            </a:r>
+          </a:p>
+          <a:p>
+            <a:endParaRPr lang="nl-NL" dirty="0">
               <a:latin typeface="Comic Sans MS"/>
               <a:cs typeface="Comic Sans MS"/>
             </a:endParaRPr>
@@ -8681,13 +8173,6 @@
   <p:clrMapOvr>
     <a:masterClrMapping/>
   </p:clrMapOvr>
-  <p:timing>
-    <p:tnLst>
-      <p:par>
-        <p:cTn xmlns:p14="http://schemas.microsoft.com/office/powerpoint/2010/main" id="1" dur="indefinite" restart="never" nodeType="tmRoot"/>
-      </p:par>
-    </p:tnLst>
-  </p:timing>
 </p:sld>
 </file>
 
@@ -8730,16 +8215,12 @@
           <a:p>
             <a:pPr algn="l"/>
             <a:r>
-              <a:rPr lang="en-US" dirty="0" smtClean="0">
+              <a:rPr lang="en-US" dirty="0">
                 <a:latin typeface="Comic Sans MS"/>
                 <a:cs typeface="Comic Sans MS"/>
               </a:rPr>
               <a:t>Bongo</a:t>
             </a:r>
-            <a:endParaRPr lang="en-US" dirty="0">
-              <a:latin typeface="Comic Sans MS"/>
-              <a:cs typeface="Comic Sans MS"/>
-            </a:endParaRPr>
           </a:p>
         </p:txBody>
       </p:sp>
@@ -8811,141 +8292,11 @@
           <a:lstStyle/>
           <a:p>
             <a:r>
-              <a:rPr lang="nl-NL" dirty="0" smtClean="0">
+              <a:rPr lang="nl-NL" dirty="0">
                 <a:latin typeface="Comic Sans MS"/>
                 <a:cs typeface="Comic Sans MS"/>
               </a:rPr>
               <a:t>We willen dat de drum geluid maakt als we hem raken.</a:t>
-            </a:r>
-          </a:p>
-          <a:p>
-            <a:endParaRPr lang="nl-NL" dirty="0" smtClean="0">
-              <a:latin typeface="Comic Sans MS"/>
-              <a:cs typeface="Comic Sans MS"/>
-            </a:endParaRPr>
-          </a:p>
-          <a:p>
-            <a:r>
-              <a:rPr lang="nl-NL" dirty="0" smtClean="0">
-                <a:latin typeface="Comic Sans MS"/>
-                <a:cs typeface="Comic Sans MS"/>
-              </a:rPr>
-              <a:t>Klik </a:t>
-            </a:r>
-            <a:r>
-              <a:rPr lang="nl-NL" dirty="0">
-                <a:latin typeface="Comic Sans MS"/>
-                <a:cs typeface="Comic Sans MS"/>
-              </a:rPr>
-              <a:t>op </a:t>
-            </a:r>
-            <a:r>
-              <a:rPr lang="nl-NL" dirty="0" smtClean="0">
-                <a:latin typeface="Comic Sans MS"/>
-                <a:cs typeface="Comic Sans MS"/>
-              </a:rPr>
-              <a:t>‘</a:t>
-            </a:r>
-            <a:r>
-              <a:rPr lang="nl-NL" dirty="0" smtClean="0">
-                <a:solidFill>
-                  <a:srgbClr val="AC18B9"/>
-                </a:solidFill>
-                <a:latin typeface="Comic Sans MS"/>
-                <a:cs typeface="Comic Sans MS"/>
-              </a:rPr>
-              <a:t>Geluid</a:t>
-            </a:r>
-            <a:r>
-              <a:rPr lang="nl-NL" dirty="0" smtClean="0">
-                <a:latin typeface="Comic Sans MS"/>
-                <a:cs typeface="Comic Sans MS"/>
-              </a:rPr>
-              <a:t>’ </a:t>
-            </a:r>
-            <a:r>
-              <a:rPr lang="nl-NL" dirty="0">
-                <a:latin typeface="Comic Sans MS"/>
-                <a:cs typeface="Comic Sans MS"/>
-              </a:rPr>
-              <a:t>bouwstenen.</a:t>
-            </a:r>
-          </a:p>
-          <a:p>
-            <a:r>
-              <a:rPr lang="nl-NL" dirty="0" smtClean="0">
-                <a:latin typeface="Comic Sans MS"/>
-                <a:cs typeface="Comic Sans MS"/>
-              </a:rPr>
-              <a:t>Sleep </a:t>
-            </a:r>
-            <a:r>
-              <a:rPr lang="nl-NL" dirty="0">
-                <a:latin typeface="Comic Sans MS"/>
-                <a:cs typeface="Comic Sans MS"/>
-              </a:rPr>
-              <a:t>dan de bouwsteen </a:t>
-            </a:r>
-            <a:r>
-              <a:rPr lang="nl-NL" dirty="0" smtClean="0">
-                <a:latin typeface="Comic Sans MS"/>
-                <a:cs typeface="Comic Sans MS"/>
-              </a:rPr>
-              <a:t>‘</a:t>
-            </a:r>
-            <a:r>
-              <a:rPr lang="nl-NL" dirty="0" smtClean="0">
-                <a:solidFill>
-                  <a:srgbClr val="AC18B9"/>
-                </a:solidFill>
-                <a:latin typeface="Comic Sans MS"/>
-                <a:cs typeface="Comic Sans MS"/>
-              </a:rPr>
-              <a:t>speel slagwerk  - tellen</a:t>
-            </a:r>
-            <a:r>
-              <a:rPr lang="nl-NL" dirty="0" smtClean="0">
-                <a:latin typeface="Comic Sans MS"/>
-                <a:cs typeface="Comic Sans MS"/>
-              </a:rPr>
-              <a:t>’ </a:t>
-            </a:r>
-            <a:r>
-              <a:rPr lang="nl-NL" dirty="0">
-                <a:latin typeface="Comic Sans MS"/>
-                <a:cs typeface="Comic Sans MS"/>
-              </a:rPr>
-              <a:t>naar het programma veld en plaats hem </a:t>
-            </a:r>
-            <a:r>
-              <a:rPr lang="nl-NL" dirty="0" smtClean="0">
-                <a:latin typeface="Comic Sans MS"/>
-                <a:cs typeface="Comic Sans MS"/>
-              </a:rPr>
-              <a:t>binnen het </a:t>
-            </a:r>
-            <a:r>
-              <a:rPr lang="nl-NL" dirty="0" err="1" smtClean="0">
-                <a:latin typeface="Comic Sans MS"/>
-                <a:cs typeface="Comic Sans MS"/>
-              </a:rPr>
-              <a:t>als-dan</a:t>
-            </a:r>
-            <a:r>
-              <a:rPr lang="nl-NL" dirty="0" smtClean="0">
-                <a:latin typeface="Comic Sans MS"/>
-                <a:cs typeface="Comic Sans MS"/>
-              </a:rPr>
-              <a:t> blok.</a:t>
-            </a:r>
-          </a:p>
-          <a:p>
-            <a:r>
-              <a:rPr lang="nl-NL" dirty="0" smtClean="0">
-                <a:latin typeface="Comic Sans MS"/>
-                <a:cs typeface="Comic Sans MS"/>
-              </a:rPr>
-              <a:t>Klik op de 1 in het blok en selecteer een geluid.</a:t>
             </a:r>
           </a:p>
           <a:p>
@@ -8960,30 +8311,107 @@
                 <a:latin typeface="Comic Sans MS"/>
                 <a:cs typeface="Comic Sans MS"/>
               </a:rPr>
-              <a:t>Kijk wat er gebeurt als je de groene vlag klikt. </a:t>
-            </a:r>
-          </a:p>
-          <a:p>
-            <a:r>
-              <a:rPr lang="nl-NL" dirty="0" smtClean="0">
-                <a:latin typeface="Comic Sans MS"/>
-                <a:cs typeface="Comic Sans MS"/>
-              </a:rPr>
-              <a:t>Als je met je hand naar de trommel beweegt wordt het geluid gespeeld. Het geluid blijft herhalen als je hand op de drum blijft, dat hoort natuurlijk niet!</a:t>
-            </a:r>
+              <a:t>Klik op ‘</a:t>
+            </a:r>
+            <a:r>
+              <a:rPr lang="nl-NL" dirty="0">
+                <a:solidFill>
+                  <a:srgbClr val="AC18B9"/>
+                </a:solidFill>
+                <a:latin typeface="Comic Sans MS"/>
+                <a:cs typeface="Comic Sans MS"/>
+              </a:rPr>
+              <a:t>Geluid</a:t>
+            </a:r>
+            <a:r>
+              <a:rPr lang="nl-NL" dirty="0">
+                <a:latin typeface="Comic Sans MS"/>
+                <a:cs typeface="Comic Sans MS"/>
+              </a:rPr>
+              <a:t>’ bouwstenen.</a:t>
+            </a:r>
+          </a:p>
+          <a:p>
+            <a:r>
+              <a:rPr lang="nl-NL" dirty="0">
+                <a:latin typeface="Comic Sans MS"/>
+                <a:cs typeface="Comic Sans MS"/>
+              </a:rPr>
+              <a:t>Sleep dan de bouwsteen ‘</a:t>
+            </a:r>
+            <a:r>
+              <a:rPr lang="nl-NL" dirty="0">
+                <a:solidFill>
+                  <a:srgbClr val="AC18B9"/>
+                </a:solidFill>
+                <a:latin typeface="Comic Sans MS"/>
+                <a:cs typeface="Comic Sans MS"/>
+              </a:rPr>
+              <a:t>speel slagwerk  - tellen</a:t>
+            </a:r>
+            <a:r>
+              <a:rPr lang="nl-NL" dirty="0">
+                <a:latin typeface="Comic Sans MS"/>
+                <a:cs typeface="Comic Sans MS"/>
+              </a:rPr>
+              <a:t>’ naar het programma veld en plaats hem binnen het </a:t>
+            </a:r>
+            <a:r>
+              <a:rPr lang="nl-NL" dirty="0" err="1">
+                <a:latin typeface="Comic Sans MS"/>
+                <a:cs typeface="Comic Sans MS"/>
+              </a:rPr>
+              <a:t>als-dan</a:t>
+            </a:r>
+            <a:r>
+              <a:rPr lang="nl-NL" dirty="0">
+                <a:latin typeface="Comic Sans MS"/>
+                <a:cs typeface="Comic Sans MS"/>
+              </a:rPr>
+              <a:t> blok.</a:t>
+            </a:r>
+          </a:p>
+          <a:p>
+            <a:r>
+              <a:rPr lang="nl-NL" dirty="0">
+                <a:latin typeface="Comic Sans MS"/>
+                <a:cs typeface="Comic Sans MS"/>
+              </a:rPr>
+              <a:t>Klik op de 1 in het blok en selecteer een geluid.</a:t>
+            </a:r>
+          </a:p>
+          <a:p>
             <a:endParaRPr lang="nl-NL" dirty="0">
               <a:latin typeface="Comic Sans MS"/>
               <a:cs typeface="Comic Sans MS"/>
             </a:endParaRPr>
           </a:p>
           <a:p>
-            <a:endParaRPr lang="nl-NL" dirty="0" smtClean="0">
+            <a:r>
+              <a:rPr lang="nl-NL" dirty="0">
+                <a:latin typeface="Comic Sans MS"/>
+                <a:cs typeface="Comic Sans MS"/>
+              </a:rPr>
+              <a:t>Kijk wat er gebeurt als je de groene vlag klikt. </a:t>
+            </a:r>
+          </a:p>
+          <a:p>
+            <a:r>
+              <a:rPr lang="nl-NL" dirty="0">
+                <a:latin typeface="Comic Sans MS"/>
+                <a:cs typeface="Comic Sans MS"/>
+              </a:rPr>
+              <a:t>Als je met je hand naar de trommel beweegt wordt het geluid gespeeld. Het geluid blijft herhalen als je hand op de drum blijft, dat hoort natuurlijk niet!</a:t>
+            </a:r>
+          </a:p>
+          <a:p>
+            <a:endParaRPr lang="nl-NL" dirty="0">
               <a:latin typeface="Comic Sans MS"/>
               <a:cs typeface="Comic Sans MS"/>
             </a:endParaRPr>
           </a:p>
           <a:p>
-            <a:endParaRPr lang="nl-NL" dirty="0" smtClean="0">
+            <a:endParaRPr lang="nl-NL" dirty="0">
               <a:latin typeface="Comic Sans MS"/>
               <a:cs typeface="Comic Sans MS"/>
             </a:endParaRPr>
@@ -9068,13 +8496,6 @@
   <p:clrMapOvr>
     <a:masterClrMapping/>
   </p:clrMapOvr>
-  <p:timing>
-    <p:tnLst>
-      <p:par>
-        <p:cTn xmlns:p14="http://schemas.microsoft.com/office/powerpoint/2010/main" id="1" dur="indefinite" restart="never" nodeType="tmRoot"/>
-      </p:par>
-    </p:tnLst>
-  </p:timing>
 </p:sld>
 </file>
 
@@ -9117,16 +8538,12 @@
           <a:p>
             <a:pPr algn="l"/>
             <a:r>
-              <a:rPr lang="en-US" dirty="0" smtClean="0">
+              <a:rPr lang="en-US" dirty="0">
                 <a:latin typeface="Comic Sans MS"/>
                 <a:cs typeface="Comic Sans MS"/>
               </a:rPr>
               <a:t>Bongo</a:t>
             </a:r>
-            <a:endParaRPr lang="en-US" dirty="0">
-              <a:latin typeface="Comic Sans MS"/>
-              <a:cs typeface="Comic Sans MS"/>
-            </a:endParaRPr>
           </a:p>
         </p:txBody>
       </p:sp>
@@ -9198,132 +8615,11 @@
           <a:lstStyle/>
           <a:p>
             <a:r>
-              <a:rPr lang="nl-NL" dirty="0" smtClean="0">
+              <a:rPr lang="nl-NL" dirty="0">
                 <a:latin typeface="Comic Sans MS"/>
                 <a:cs typeface="Comic Sans MS"/>
               </a:rPr>
               <a:t>We willen dat de drum maar een keer geluid maakt als we hem raken. We doen dit door te wachten tot geen van beide handen de drum nog raakt voordat we weer opnieuw gaan kijken of de drum geraakt wordt.</a:t>
-            </a:r>
-          </a:p>
-          <a:p>
-            <a:endParaRPr lang="nl-NL" dirty="0" smtClean="0">
-              <a:latin typeface="Comic Sans MS"/>
-              <a:cs typeface="Comic Sans MS"/>
-            </a:endParaRPr>
-          </a:p>
-          <a:p>
-            <a:r>
-              <a:rPr lang="nl-NL" dirty="0" smtClean="0">
-                <a:latin typeface="Comic Sans MS"/>
-                <a:cs typeface="Comic Sans MS"/>
-              </a:rPr>
-              <a:t>Klik </a:t>
-            </a:r>
-            <a:r>
-              <a:rPr lang="nl-NL" dirty="0">
-                <a:latin typeface="Comic Sans MS"/>
-                <a:cs typeface="Comic Sans MS"/>
-              </a:rPr>
-              <a:t>op </a:t>
-            </a:r>
-            <a:r>
-              <a:rPr lang="nl-NL" dirty="0" smtClean="0">
-                <a:latin typeface="Comic Sans MS"/>
-                <a:cs typeface="Comic Sans MS"/>
-              </a:rPr>
-              <a:t>‘</a:t>
-            </a:r>
-            <a:r>
-              <a:rPr lang="nl-NL" dirty="0" smtClean="0">
-                <a:solidFill>
-                  <a:srgbClr val="AC18B9"/>
-                </a:solidFill>
-                <a:latin typeface="Comic Sans MS"/>
-                <a:cs typeface="Comic Sans MS"/>
-              </a:rPr>
-              <a:t>Besturen</a:t>
-            </a:r>
-            <a:r>
-              <a:rPr lang="nl-NL" dirty="0" smtClean="0">
-                <a:latin typeface="Comic Sans MS"/>
-                <a:cs typeface="Comic Sans MS"/>
-              </a:rPr>
-              <a:t>’ </a:t>
-            </a:r>
-            <a:r>
-              <a:rPr lang="nl-NL" dirty="0">
-                <a:latin typeface="Comic Sans MS"/>
-                <a:cs typeface="Comic Sans MS"/>
-              </a:rPr>
-              <a:t>bouwstenen.</a:t>
-            </a:r>
-          </a:p>
-          <a:p>
-            <a:r>
-              <a:rPr lang="nl-NL" dirty="0" smtClean="0">
-                <a:latin typeface="Comic Sans MS"/>
-                <a:cs typeface="Comic Sans MS"/>
-              </a:rPr>
-              <a:t>Sleep </a:t>
-            </a:r>
-            <a:r>
-              <a:rPr lang="nl-NL" dirty="0">
-                <a:latin typeface="Comic Sans MS"/>
-                <a:cs typeface="Comic Sans MS"/>
-              </a:rPr>
-              <a:t>dan de bouwsteen </a:t>
-            </a:r>
-            <a:r>
-              <a:rPr lang="nl-NL" dirty="0" smtClean="0">
-                <a:latin typeface="Comic Sans MS"/>
-                <a:cs typeface="Comic Sans MS"/>
-              </a:rPr>
-              <a:t>‘</a:t>
-            </a:r>
-            <a:r>
-              <a:rPr lang="nl-NL" dirty="0" smtClean="0">
-                <a:solidFill>
-                  <a:srgbClr val="AC18B9"/>
-                </a:solidFill>
-                <a:latin typeface="Comic Sans MS"/>
-                <a:cs typeface="Comic Sans MS"/>
-              </a:rPr>
-              <a:t>wacht tot</a:t>
-            </a:r>
-            <a:r>
-              <a:rPr lang="nl-NL" dirty="0" smtClean="0">
-                <a:latin typeface="Comic Sans MS"/>
-                <a:cs typeface="Comic Sans MS"/>
-              </a:rPr>
-              <a:t>’ </a:t>
-            </a:r>
-            <a:r>
-              <a:rPr lang="nl-NL" dirty="0">
-                <a:latin typeface="Comic Sans MS"/>
-                <a:cs typeface="Comic Sans MS"/>
-              </a:rPr>
-              <a:t>naar het programma veld en plaats hem </a:t>
-            </a:r>
-            <a:r>
-              <a:rPr lang="nl-NL" dirty="0" smtClean="0">
-                <a:latin typeface="Comic Sans MS"/>
-                <a:cs typeface="Comic Sans MS"/>
-              </a:rPr>
-              <a:t>binnen het </a:t>
-            </a:r>
-            <a:r>
-              <a:rPr lang="nl-NL" dirty="0" err="1" smtClean="0">
-                <a:latin typeface="Comic Sans MS"/>
-                <a:cs typeface="Comic Sans MS"/>
-              </a:rPr>
-              <a:t>als-dan</a:t>
-            </a:r>
-            <a:r>
-              <a:rPr lang="nl-NL" dirty="0" smtClean="0">
-                <a:latin typeface="Comic Sans MS"/>
-                <a:cs typeface="Comic Sans MS"/>
-              </a:rPr>
-              <a:t> blok na het speel slagwerk blok.</a:t>
             </a:r>
           </a:p>
           <a:p>
@@ -9334,35 +8630,107 @@
           </a:p>
           <a:p>
             <a:r>
-              <a:rPr lang="nl-NL" dirty="0" smtClean="0">
+              <a:rPr lang="nl-NL" dirty="0">
+                <a:latin typeface="Comic Sans MS"/>
+                <a:cs typeface="Comic Sans MS"/>
+              </a:rPr>
+              <a:t>Klik op ‘</a:t>
+            </a:r>
+            <a:r>
+              <a:rPr lang="nl-NL" dirty="0">
+                <a:solidFill>
+                  <a:srgbClr val="AC18B9"/>
+                </a:solidFill>
+                <a:latin typeface="Comic Sans MS"/>
+                <a:cs typeface="Comic Sans MS"/>
+              </a:rPr>
+              <a:t>Besturen</a:t>
+            </a:r>
+            <a:r>
+              <a:rPr lang="nl-NL" dirty="0">
+                <a:latin typeface="Comic Sans MS"/>
+                <a:cs typeface="Comic Sans MS"/>
+              </a:rPr>
+              <a:t>’ bouwstenen.</a:t>
+            </a:r>
+          </a:p>
+          <a:p>
+            <a:r>
+              <a:rPr lang="nl-NL" dirty="0">
+                <a:latin typeface="Comic Sans MS"/>
+                <a:cs typeface="Comic Sans MS"/>
+              </a:rPr>
+              <a:t>Sleep dan de bouwsteen ‘</a:t>
+            </a:r>
+            <a:r>
+              <a:rPr lang="nl-NL" dirty="0">
+                <a:solidFill>
+                  <a:srgbClr val="AC18B9"/>
+                </a:solidFill>
+                <a:latin typeface="Comic Sans MS"/>
+                <a:cs typeface="Comic Sans MS"/>
+              </a:rPr>
+              <a:t>wacht tot</a:t>
+            </a:r>
+            <a:r>
+              <a:rPr lang="nl-NL" dirty="0">
+                <a:latin typeface="Comic Sans MS"/>
+                <a:cs typeface="Comic Sans MS"/>
+              </a:rPr>
+              <a:t>’ naar het programma veld en plaats hem binnen het </a:t>
+            </a:r>
+            <a:r>
+              <a:rPr lang="nl-NL" dirty="0" err="1">
+                <a:latin typeface="Comic Sans MS"/>
+                <a:cs typeface="Comic Sans MS"/>
+              </a:rPr>
+              <a:t>als-dan</a:t>
+            </a:r>
+            <a:r>
+              <a:rPr lang="nl-NL" dirty="0">
+                <a:latin typeface="Comic Sans MS"/>
+                <a:cs typeface="Comic Sans MS"/>
+              </a:rPr>
+              <a:t> blok na het speel slagwerk blok.</a:t>
+            </a:r>
+          </a:p>
+          <a:p>
+            <a:endParaRPr lang="nl-NL" dirty="0">
+              <a:latin typeface="Comic Sans MS"/>
+              <a:cs typeface="Comic Sans MS"/>
+            </a:endParaRPr>
+          </a:p>
+          <a:p>
+            <a:r>
+              <a:rPr lang="nl-NL" dirty="0">
                 <a:latin typeface="Comic Sans MS"/>
                 <a:cs typeface="Comic Sans MS"/>
               </a:rPr>
               <a:t>We gaan nu de conditie bouwen die kijkt of de drum </a:t>
             </a:r>
             <a:r>
-              <a:rPr lang="nl-NL" b="1" dirty="0" smtClean="0">
+              <a:rPr lang="nl-NL" b="1" dirty="0">
                 <a:latin typeface="Comic Sans MS"/>
                 <a:cs typeface="Comic Sans MS"/>
               </a:rPr>
               <a:t>niet</a:t>
             </a:r>
             <a:r>
-              <a:rPr lang="nl-NL" dirty="0" smtClean="0">
+              <a:rPr lang="nl-NL" dirty="0">
                 <a:latin typeface="Comic Sans MS"/>
                 <a:cs typeface="Comic Sans MS"/>
               </a:rPr>
               <a:t> door hand1 </a:t>
             </a:r>
             <a:r>
-              <a:rPr lang="nl-NL" b="1" dirty="0" smtClean="0">
+              <a:rPr lang="nl-NL" b="1" dirty="0">
                 <a:latin typeface="Comic Sans MS"/>
                 <a:cs typeface="Comic Sans MS"/>
               </a:rPr>
               <a:t>of</a:t>
             </a:r>
             <a:r>
-              <a:rPr lang="nl-NL" dirty="0" smtClean="0">
+              <a:rPr lang="nl-NL" dirty="0">
                 <a:latin typeface="Comic Sans MS"/>
                 <a:cs typeface="Comic Sans MS"/>
               </a:rPr>
@@ -9370,7 +8738,7 @@
             </a:r>
           </a:p>
           <a:p>
-            <a:endParaRPr lang="nl-NL" dirty="0" smtClean="0">
+            <a:endParaRPr lang="nl-NL" dirty="0">
               <a:latin typeface="Comic Sans MS"/>
               <a:cs typeface="Comic Sans MS"/>
             </a:endParaRPr>
@@ -9455,13 +8823,6 @@
   <p:clrMapOvr>
     <a:masterClrMapping/>
   </p:clrMapOvr>
-  <p:timing>
-    <p:tnLst>
-      <p:par>
-        <p:cTn xmlns:p14="http://schemas.microsoft.com/office/powerpoint/2010/main" id="1" dur="indefinite" restart="never" nodeType="tmRoot"/>
-      </p:par>
-    </p:tnLst>
-  </p:timing>
 </p:sld>
 </file>
 

</xml_diff>